<commit_message>
compiled ideas for presentation
</commit_message>
<xml_diff>
--- a/Presentation/AI_project_presentation.pptx
+++ b/Presentation/AI_project_presentation.pptx
@@ -5,10 +5,10 @@
     <p:sldMasterId id="2147483648" r:id="rId1"/>
   </p:sldMasterIdLst>
   <p:notesMasterIdLst>
-    <p:notesMasterId r:id="rId21"/>
+    <p:notesMasterId r:id="rId20"/>
   </p:notesMasterIdLst>
   <p:handoutMasterIdLst>
-    <p:handoutMasterId r:id="rId22"/>
+    <p:handoutMasterId r:id="rId21"/>
   </p:handoutMasterIdLst>
   <p:sldIdLst>
     <p:sldId id="256" r:id="rId2"/>
@@ -21,15 +21,14 @@
     <p:sldId id="260" r:id="rId9"/>
     <p:sldId id="262" r:id="rId10"/>
     <p:sldId id="266" r:id="rId11"/>
-    <p:sldId id="268" r:id="rId12"/>
-    <p:sldId id="270" r:id="rId13"/>
-    <p:sldId id="271" r:id="rId14"/>
-    <p:sldId id="279" r:id="rId15"/>
-    <p:sldId id="277" r:id="rId16"/>
-    <p:sldId id="276" r:id="rId17"/>
-    <p:sldId id="263" r:id="rId18"/>
-    <p:sldId id="261" r:id="rId19"/>
-    <p:sldId id="269" r:id="rId20"/>
+    <p:sldId id="270" r:id="rId12"/>
+    <p:sldId id="271" r:id="rId13"/>
+    <p:sldId id="279" r:id="rId14"/>
+    <p:sldId id="277" r:id="rId15"/>
+    <p:sldId id="276" r:id="rId16"/>
+    <p:sldId id="263" r:id="rId17"/>
+    <p:sldId id="261" r:id="rId18"/>
+    <p:sldId id="269" r:id="rId19"/>
   </p:sldIdLst>
   <p:sldSz cx="9144000" cy="6858000" type="screen4x3"/>
   <p:notesSz cx="6858000" cy="9144000"/>
@@ -4188,8 +4187,12 @@
               <a:t> </a:t>
             </a:r>
             <a:r>
+              <a:rPr lang="de-DE" dirty="0" err="1"/>
+              <a:t>C</a:t>
+            </a:r>
+            <a:r>
               <a:rPr lang="de-DE" dirty="0" err="1" smtClean="0"/>
-              <a:t>course</a:t>
+              <a:t>ourse</a:t>
             </a:r>
             <a:r>
               <a:rPr lang="de-DE" dirty="0" smtClean="0"/>
@@ -4203,12 +4206,20 @@
           </a:p>
           <a:p>
             <a:r>
-              <a:rPr lang="de-DE" dirty="0" err="1" smtClean="0"/>
-              <a:t>At</a:t>
+              <a:rPr lang="de-DE" dirty="0" err="1"/>
+              <a:t>a</a:t>
+            </a:r>
+            <a:r>
+              <a:rPr lang="de-DE" smtClean="0"/>
+              <a:t>t</a:t>
             </a:r>
             <a:r>
               <a:rPr lang="de-DE" dirty="0" smtClean="0"/>
-              <a:t> KTH</a:t>
+              <a:t> </a:t>
+            </a:r>
+            <a:r>
+              <a:rPr lang="de-DE" dirty="0" smtClean="0"/>
+              <a:t>KTH</a:t>
             </a:r>
             <a:endParaRPr lang="de-DE" dirty="0"/>
           </a:p>
@@ -4293,6 +4304,13 @@
   <p:clrMapOvr>
     <a:masterClrMapping/>
   </p:clrMapOvr>
+  <p:timing>
+    <p:tnLst>
+      <p:par>
+        <p:cTn xmlns:p14="http://schemas.microsoft.com/office/powerpoint/2010/main" id="1" dur="indefinite" restart="never" nodeType="tmRoot"/>
+      </p:par>
+    </p:tnLst>
+  </p:timing>
 </p:sld>
 </file>
 
@@ -7760,1326 +7778,6 @@
 </file>
 
 <file path=ppt/slides/slide11.xml><?xml version="1.0" encoding="utf-8"?>
-<p:sld xmlns:a="http://schemas.openxmlformats.org/drawingml/2006/main" xmlns:r="http://schemas.openxmlformats.org/officeDocument/2006/relationships" xmlns:p="http://schemas.openxmlformats.org/presentationml/2006/main" show="0">
-  <p:cSld>
-    <p:spTree>
-      <p:nvGrpSpPr>
-        <p:cNvPr id="1" name=""/>
-        <p:cNvGrpSpPr/>
-        <p:nvPr/>
-      </p:nvGrpSpPr>
-      <p:grpSpPr>
-        <a:xfrm>
-          <a:off x="0" y="0"/>
-          <a:ext cx="0" cy="0"/>
-          <a:chOff x="0" y="0"/>
-          <a:chExt cx="0" cy="0"/>
-        </a:xfrm>
-      </p:grpSpPr>
-      <p:sp>
-        <p:nvSpPr>
-          <p:cNvPr id="2" name="Titel 1"/>
-          <p:cNvSpPr>
-            <a:spLocks noGrp="1"/>
-          </p:cNvSpPr>
-          <p:nvPr>
-            <p:ph type="title"/>
-          </p:nvPr>
-        </p:nvSpPr>
-        <p:spPr>
-          <a:xfrm>
-            <a:off x="457200" y="274637"/>
-            <a:ext cx="3600502" cy="2700791"/>
-          </a:xfrm>
-        </p:spPr>
-        <p:txBody>
-          <a:bodyPr>
-            <a:normAutofit/>
-          </a:bodyPr>
-          <a:lstStyle/>
-          <a:p>
-            <a:pPr algn="l"/>
-            <a:r>
-              <a:rPr lang="de-DE" dirty="0" err="1" smtClean="0"/>
-              <a:t>Bag</a:t>
-            </a:r>
-            <a:r>
-              <a:rPr lang="de-DE" dirty="0" smtClean="0"/>
-              <a:t>-</a:t>
-            </a:r>
-            <a:r>
-              <a:rPr lang="de-DE" dirty="0" err="1" smtClean="0"/>
-              <a:t>of</a:t>
-            </a:r>
-            <a:r>
-              <a:rPr lang="de-DE" dirty="0" smtClean="0"/>
-              <a:t>-Words Model</a:t>
-            </a:r>
-            <a:endParaRPr lang="de-DE" dirty="0"/>
-          </a:p>
-        </p:txBody>
-      </p:sp>
-      <p:sp>
-        <p:nvSpPr>
-          <p:cNvPr id="4" name="Datumsplatzhalter 3"/>
-          <p:cNvSpPr>
-            <a:spLocks noGrp="1"/>
-          </p:cNvSpPr>
-          <p:nvPr>
-            <p:ph type="dt" sz="half" idx="10"/>
-          </p:nvPr>
-        </p:nvSpPr>
-        <p:spPr/>
-        <p:txBody>
-          <a:bodyPr/>
-          <a:lstStyle/>
-          <a:p>
-            <a:fld id="{0176A06F-AB14-F94A-8BCE-1C0CB4911F8E}" type="datetime5">
-              <a:rPr lang="de-DE" smtClean="0"/>
-              <a:t>19-Okt-15</a:t>
-            </a:fld>
-            <a:endParaRPr lang="de-DE"/>
-          </a:p>
-        </p:txBody>
-      </p:sp>
-      <p:sp>
-        <p:nvSpPr>
-          <p:cNvPr id="5" name="Fußzeilenplatzhalter 4"/>
-          <p:cNvSpPr>
-            <a:spLocks noGrp="1"/>
-          </p:cNvSpPr>
-          <p:nvPr>
-            <p:ph type="ftr" sz="quarter" idx="11"/>
-          </p:nvPr>
-        </p:nvSpPr>
-        <p:spPr/>
-        <p:txBody>
-          <a:bodyPr/>
-          <a:lstStyle/>
-          <a:p>
-            <a:r>
-              <a:rPr lang="de-DE" smtClean="0"/>
-              <a:t>A. Patel, C. Kaiser, L. Schmitz, N. Tatarakis </a:t>
-            </a:r>
-            <a:endParaRPr lang="de-DE"/>
-          </a:p>
-        </p:txBody>
-      </p:sp>
-      <p:sp>
-        <p:nvSpPr>
-          <p:cNvPr id="6" name="Foliennummernplatzhalter 5"/>
-          <p:cNvSpPr>
-            <a:spLocks noGrp="1"/>
-          </p:cNvSpPr>
-          <p:nvPr>
-            <p:ph type="sldNum" sz="quarter" idx="12"/>
-          </p:nvPr>
-        </p:nvSpPr>
-        <p:spPr/>
-        <p:txBody>
-          <a:bodyPr/>
-          <a:lstStyle/>
-          <a:p>
-            <a:fld id="{C01938AF-F9EA-434A-A4EB-30D6D6E13CD1}" type="slidenum">
-              <a:rPr lang="de-DE" smtClean="0"/>
-              <a:t>11</a:t>
-            </a:fld>
-            <a:endParaRPr lang="de-DE"/>
-          </a:p>
-        </p:txBody>
-      </p:sp>
-      <p:sp>
-        <p:nvSpPr>
-          <p:cNvPr id="7" name="Pfeil nach links/rechts/oben 6"/>
-          <p:cNvSpPr/>
-          <p:nvPr/>
-        </p:nvSpPr>
-        <p:spPr>
-          <a:xfrm>
-            <a:off x="4057702" y="3540782"/>
-            <a:ext cx="2336682" cy="950133"/>
-          </a:xfrm>
-          <a:prstGeom prst="leftRightUpArrow">
-            <a:avLst>
-              <a:gd name="adj1" fmla="val 8051"/>
-              <a:gd name="adj2" fmla="val 25000"/>
-              <a:gd name="adj3" fmla="val 25000"/>
-            </a:avLst>
-          </a:prstGeom>
-        </p:spPr>
-        <p:style>
-          <a:lnRef idx="2">
-            <a:schemeClr val="accent1">
-              <a:shade val="50000"/>
-            </a:schemeClr>
-          </a:lnRef>
-          <a:fillRef idx="1">
-            <a:schemeClr val="accent1"/>
-          </a:fillRef>
-          <a:effectRef idx="0">
-            <a:schemeClr val="accent1"/>
-          </a:effectRef>
-          <a:fontRef idx="minor">
-            <a:schemeClr val="lt1"/>
-          </a:fontRef>
-        </p:style>
-        <p:txBody>
-          <a:bodyPr rtlCol="0" anchor="ctr"/>
-          <a:lstStyle/>
-          <a:p>
-            <a:pPr algn="ctr"/>
-            <a:endParaRPr lang="de-DE" sz="1200"/>
-          </a:p>
-        </p:txBody>
-      </p:sp>
-      <p:sp>
-        <p:nvSpPr>
-          <p:cNvPr id="8" name="Zylinder 7"/>
-          <p:cNvSpPr/>
-          <p:nvPr/>
-        </p:nvSpPr>
-        <p:spPr>
-          <a:xfrm>
-            <a:off x="4481236" y="167052"/>
-            <a:ext cx="1489614" cy="744807"/>
-          </a:xfrm>
-          <a:prstGeom prst="can">
-            <a:avLst/>
-          </a:prstGeom>
-        </p:spPr>
-        <p:style>
-          <a:lnRef idx="2">
-            <a:schemeClr val="accent1">
-              <a:shade val="50000"/>
-            </a:schemeClr>
-          </a:lnRef>
-          <a:fillRef idx="1">
-            <a:schemeClr val="accent1"/>
-          </a:fillRef>
-          <a:effectRef idx="0">
-            <a:schemeClr val="accent1"/>
-          </a:effectRef>
-          <a:fontRef idx="minor">
-            <a:schemeClr val="lt1"/>
-          </a:fontRef>
-        </p:style>
-        <p:txBody>
-          <a:bodyPr rot="0" spcFirstLastPara="0" vert="horz" wrap="square" lIns="91440" tIns="45720" rIns="91440" bIns="45720" numCol="1" spcCol="0" rtlCol="0" fromWordArt="0" anchor="ctr" anchorCtr="0" forceAA="0" compatLnSpc="1">
-            <a:prstTxWarp prst="textNoShape">
-              <a:avLst/>
-            </a:prstTxWarp>
-            <a:noAutofit/>
-          </a:bodyPr>
-          <a:lstStyle/>
-          <a:p>
-            <a:pPr algn="ctr">
-              <a:spcAft>
-                <a:spcPts val="0"/>
-              </a:spcAft>
-            </a:pPr>
-            <a:r>
-              <a:rPr lang="en-GB" sz="1200">
-                <a:effectLst/>
-                <a:ea typeface="ＭＳ 明朝"/>
-                <a:cs typeface="Times New Roman"/>
-              </a:rPr>
-              <a:t>Dataset</a:t>
-            </a:r>
-            <a:endParaRPr lang="de-DE" sz="1200">
-              <a:effectLst/>
-              <a:ea typeface="ＭＳ 明朝"/>
-              <a:cs typeface="Times New Roman"/>
-            </a:endParaRPr>
-          </a:p>
-        </p:txBody>
-      </p:sp>
-      <p:sp>
-        <p:nvSpPr>
-          <p:cNvPr id="9" name="Rechteck 8"/>
-          <p:cNvSpPr/>
-          <p:nvPr/>
-        </p:nvSpPr>
-        <p:spPr>
-          <a:xfrm>
-            <a:off x="4481236" y="1283049"/>
-            <a:ext cx="1489614" cy="577640"/>
-          </a:xfrm>
-          <a:prstGeom prst="rect">
-            <a:avLst/>
-          </a:prstGeom>
-        </p:spPr>
-        <p:style>
-          <a:lnRef idx="2">
-            <a:schemeClr val="accent1"/>
-          </a:lnRef>
-          <a:fillRef idx="1">
-            <a:schemeClr val="lt1"/>
-          </a:fillRef>
-          <a:effectRef idx="0">
-            <a:schemeClr val="accent1"/>
-          </a:effectRef>
-          <a:fontRef idx="minor">
-            <a:schemeClr val="dk1"/>
-          </a:fontRef>
-        </p:style>
-        <p:txBody>
-          <a:bodyPr rot="0" spcFirstLastPara="0" vert="horz" wrap="square" lIns="91440" tIns="45720" rIns="91440" bIns="45720" numCol="1" spcCol="0" rtlCol="0" fromWordArt="0" anchor="ctr" anchorCtr="0" forceAA="0" compatLnSpc="1">
-            <a:prstTxWarp prst="textNoShape">
-              <a:avLst/>
-            </a:prstTxWarp>
-            <a:noAutofit/>
-          </a:bodyPr>
-          <a:lstStyle/>
-          <a:p>
-            <a:pPr algn="ctr">
-              <a:spcAft>
-                <a:spcPts val="0"/>
-              </a:spcAft>
-            </a:pPr>
-            <a:r>
-              <a:rPr lang="en-GB" sz="1200" dirty="0">
-                <a:effectLst/>
-                <a:ea typeface="ＭＳ 明朝"/>
-                <a:cs typeface="Times New Roman"/>
-              </a:rPr>
-              <a:t>Pre-Processing</a:t>
-            </a:r>
-            <a:endParaRPr lang="de-DE" sz="1200" dirty="0">
-              <a:effectLst/>
-              <a:ea typeface="ＭＳ 明朝"/>
-              <a:cs typeface="Times New Roman"/>
-            </a:endParaRPr>
-          </a:p>
-        </p:txBody>
-      </p:sp>
-      <p:sp>
-        <p:nvSpPr>
-          <p:cNvPr id="10" name="Rechteck 9"/>
-          <p:cNvSpPr/>
-          <p:nvPr/>
-        </p:nvSpPr>
-        <p:spPr>
-          <a:xfrm>
-            <a:off x="4481236" y="2209141"/>
-            <a:ext cx="1489614" cy="577640"/>
-          </a:xfrm>
-          <a:prstGeom prst="rect">
-            <a:avLst/>
-          </a:prstGeom>
-        </p:spPr>
-        <p:style>
-          <a:lnRef idx="2">
-            <a:schemeClr val="accent1"/>
-          </a:lnRef>
-          <a:fillRef idx="1">
-            <a:schemeClr val="lt1"/>
-          </a:fillRef>
-          <a:effectRef idx="0">
-            <a:schemeClr val="accent1"/>
-          </a:effectRef>
-          <a:fontRef idx="minor">
-            <a:schemeClr val="dk1"/>
-          </a:fontRef>
-        </p:style>
-        <p:txBody>
-          <a:bodyPr rot="0" spcFirstLastPara="0" vert="horz" wrap="square" lIns="91440" tIns="45720" rIns="91440" bIns="45720" numCol="1" spcCol="0" rtlCol="0" fromWordArt="0" anchor="ctr" anchorCtr="0" forceAA="0" compatLnSpc="1">
-            <a:prstTxWarp prst="textNoShape">
-              <a:avLst/>
-            </a:prstTxWarp>
-            <a:noAutofit/>
-          </a:bodyPr>
-          <a:lstStyle/>
-          <a:p>
-            <a:pPr algn="ctr">
-              <a:spcAft>
-                <a:spcPts val="0"/>
-              </a:spcAft>
-            </a:pPr>
-            <a:r>
-              <a:rPr lang="en-GB" sz="1200" dirty="0">
-                <a:effectLst/>
-                <a:ea typeface="ＭＳ 明朝"/>
-                <a:cs typeface="Times New Roman"/>
-              </a:rPr>
-              <a:t>Feature Extraction</a:t>
-            </a:r>
-            <a:endParaRPr lang="de-DE" sz="1200" dirty="0">
-              <a:effectLst/>
-              <a:ea typeface="ＭＳ 明朝"/>
-              <a:cs typeface="Times New Roman"/>
-            </a:endParaRPr>
-          </a:p>
-        </p:txBody>
-      </p:sp>
-      <p:sp>
-        <p:nvSpPr>
-          <p:cNvPr id="11" name="Zylinder 10"/>
-          <p:cNvSpPr/>
-          <p:nvPr/>
-        </p:nvSpPr>
-        <p:spPr>
-          <a:xfrm>
-            <a:off x="4481236" y="3134945"/>
-            <a:ext cx="1489614" cy="744807"/>
-          </a:xfrm>
-          <a:prstGeom prst="can">
-            <a:avLst/>
-          </a:prstGeom>
-        </p:spPr>
-        <p:style>
-          <a:lnRef idx="2">
-            <a:schemeClr val="accent1">
-              <a:shade val="50000"/>
-            </a:schemeClr>
-          </a:lnRef>
-          <a:fillRef idx="1">
-            <a:schemeClr val="accent1"/>
-          </a:fillRef>
-          <a:effectRef idx="0">
-            <a:schemeClr val="accent1"/>
-          </a:effectRef>
-          <a:fontRef idx="minor">
-            <a:schemeClr val="lt1"/>
-          </a:fontRef>
-        </p:style>
-        <p:txBody>
-          <a:bodyPr rot="0" spcFirstLastPara="0" vert="horz" wrap="square" lIns="91440" tIns="45720" rIns="91440" bIns="45720" numCol="1" spcCol="0" rtlCol="0" fromWordArt="0" anchor="ctr" anchorCtr="0" forceAA="0" compatLnSpc="1">
-            <a:prstTxWarp prst="textNoShape">
-              <a:avLst/>
-            </a:prstTxWarp>
-            <a:noAutofit/>
-          </a:bodyPr>
-          <a:lstStyle/>
-          <a:p>
-            <a:pPr algn="ctr">
-              <a:spcAft>
-                <a:spcPts val="0"/>
-              </a:spcAft>
-            </a:pPr>
-            <a:r>
-              <a:rPr lang="en-GB" sz="1200" dirty="0">
-                <a:effectLst/>
-                <a:ea typeface="ＭＳ 明朝"/>
-                <a:cs typeface="Times New Roman"/>
-              </a:rPr>
-              <a:t>Dictionary</a:t>
-            </a:r>
-            <a:endParaRPr lang="de-DE" sz="1200" dirty="0">
-              <a:effectLst/>
-              <a:ea typeface="ＭＳ 明朝"/>
-              <a:cs typeface="Times New Roman"/>
-            </a:endParaRPr>
-          </a:p>
-          <a:p>
-            <a:pPr algn="ctr">
-              <a:spcAft>
-                <a:spcPts val="0"/>
-              </a:spcAft>
-            </a:pPr>
-            <a:r>
-              <a:rPr lang="en-GB" sz="1200" dirty="0">
-                <a:effectLst/>
-                <a:ea typeface="ＭＳ 明朝"/>
-                <a:cs typeface="Times New Roman"/>
-              </a:rPr>
-              <a:t>n-gram collection</a:t>
-            </a:r>
-            <a:endParaRPr lang="de-DE" sz="1200" dirty="0">
-              <a:effectLst/>
-              <a:ea typeface="ＭＳ 明朝"/>
-              <a:cs typeface="Times New Roman"/>
-            </a:endParaRPr>
-          </a:p>
-        </p:txBody>
-      </p:sp>
-      <p:cxnSp>
-        <p:nvCxnSpPr>
-          <p:cNvPr id="12" name="Gerade Verbindung mit Pfeil 11"/>
-          <p:cNvCxnSpPr>
-            <a:stCxn id="8" idx="3"/>
-            <a:endCxn id="9" idx="0"/>
-          </p:cNvCxnSpPr>
-          <p:nvPr/>
-        </p:nvCxnSpPr>
-        <p:spPr>
-          <a:xfrm>
-            <a:off x="5226043" y="911859"/>
-            <a:ext cx="0" cy="371190"/>
-          </a:xfrm>
-          <a:prstGeom prst="straightConnector1">
-            <a:avLst/>
-          </a:prstGeom>
-          <a:ln>
-            <a:tailEnd type="arrow"/>
-          </a:ln>
-        </p:spPr>
-        <p:style>
-          <a:lnRef idx="2">
-            <a:schemeClr val="accent1"/>
-          </a:lnRef>
-          <a:fillRef idx="0">
-            <a:schemeClr val="accent1"/>
-          </a:fillRef>
-          <a:effectRef idx="1">
-            <a:schemeClr val="accent1"/>
-          </a:effectRef>
-          <a:fontRef idx="minor">
-            <a:schemeClr val="tx1"/>
-          </a:fontRef>
-        </p:style>
-      </p:cxnSp>
-      <p:cxnSp>
-        <p:nvCxnSpPr>
-          <p:cNvPr id="13" name="Gerade Verbindung mit Pfeil 12"/>
-          <p:cNvCxnSpPr>
-            <a:stCxn id="9" idx="2"/>
-            <a:endCxn id="10" idx="0"/>
-          </p:cNvCxnSpPr>
-          <p:nvPr/>
-        </p:nvCxnSpPr>
-        <p:spPr>
-          <a:xfrm>
-            <a:off x="5226043" y="1860689"/>
-            <a:ext cx="0" cy="348452"/>
-          </a:xfrm>
-          <a:prstGeom prst="straightConnector1">
-            <a:avLst/>
-          </a:prstGeom>
-          <a:ln>
-            <a:tailEnd type="arrow"/>
-          </a:ln>
-        </p:spPr>
-        <p:style>
-          <a:lnRef idx="2">
-            <a:schemeClr val="accent1"/>
-          </a:lnRef>
-          <a:fillRef idx="0">
-            <a:schemeClr val="accent1"/>
-          </a:fillRef>
-          <a:effectRef idx="1">
-            <a:schemeClr val="accent1"/>
-          </a:effectRef>
-          <a:fontRef idx="minor">
-            <a:schemeClr val="tx1"/>
-          </a:fontRef>
-        </p:style>
-      </p:cxnSp>
-      <p:cxnSp>
-        <p:nvCxnSpPr>
-          <p:cNvPr id="14" name="Gerade Verbindung mit Pfeil 13"/>
-          <p:cNvCxnSpPr>
-            <a:stCxn id="10" idx="2"/>
-            <a:endCxn id="11" idx="1"/>
-          </p:cNvCxnSpPr>
-          <p:nvPr/>
-        </p:nvCxnSpPr>
-        <p:spPr>
-          <a:xfrm>
-            <a:off x="5226043" y="2786781"/>
-            <a:ext cx="0" cy="348164"/>
-          </a:xfrm>
-          <a:prstGeom prst="straightConnector1">
-            <a:avLst/>
-          </a:prstGeom>
-          <a:ln>
-            <a:tailEnd type="arrow"/>
-          </a:ln>
-        </p:spPr>
-        <p:style>
-          <a:lnRef idx="2">
-            <a:schemeClr val="accent1"/>
-          </a:lnRef>
-          <a:fillRef idx="0">
-            <a:schemeClr val="accent1"/>
-          </a:fillRef>
-          <a:effectRef idx="1">
-            <a:schemeClr val="accent1"/>
-          </a:effectRef>
-          <a:fontRef idx="minor">
-            <a:schemeClr val="tx1"/>
-          </a:fontRef>
-        </p:style>
-      </p:cxnSp>
-      <p:sp>
-        <p:nvSpPr>
-          <p:cNvPr id="15" name="Zylinder 14"/>
-          <p:cNvSpPr/>
-          <p:nvPr/>
-        </p:nvSpPr>
-        <p:spPr>
-          <a:xfrm>
-            <a:off x="2675982" y="3878385"/>
-            <a:ext cx="1381720" cy="690860"/>
-          </a:xfrm>
-          <a:prstGeom prst="can">
-            <a:avLst/>
-          </a:prstGeom>
-        </p:spPr>
-        <p:style>
-          <a:lnRef idx="2">
-            <a:schemeClr val="accent1">
-              <a:shade val="50000"/>
-            </a:schemeClr>
-          </a:lnRef>
-          <a:fillRef idx="1">
-            <a:schemeClr val="accent1"/>
-          </a:fillRef>
-          <a:effectRef idx="0">
-            <a:schemeClr val="accent1"/>
-          </a:effectRef>
-          <a:fontRef idx="minor">
-            <a:schemeClr val="lt1"/>
-          </a:fontRef>
-        </p:style>
-        <p:txBody>
-          <a:bodyPr rot="0" spcFirstLastPara="0" vert="horz" wrap="square" lIns="91440" tIns="45720" rIns="91440" bIns="45720" numCol="1" spcCol="0" rtlCol="0" fromWordArt="0" anchor="ctr" anchorCtr="0" forceAA="0" compatLnSpc="1">
-            <a:prstTxWarp prst="textNoShape">
-              <a:avLst/>
-            </a:prstTxWarp>
-            <a:noAutofit/>
-          </a:bodyPr>
-          <a:lstStyle/>
-          <a:p>
-            <a:pPr algn="ctr">
-              <a:spcAft>
-                <a:spcPts val="0"/>
-              </a:spcAft>
-            </a:pPr>
-            <a:r>
-              <a:rPr lang="de-DE" sz="1200" dirty="0" smtClean="0">
-                <a:effectLst/>
-                <a:ea typeface="ＭＳ 明朝"/>
-                <a:cs typeface="Times New Roman"/>
-              </a:rPr>
-              <a:t>Trainingsset</a:t>
-            </a:r>
-            <a:endParaRPr lang="de-DE" sz="1200" dirty="0">
-              <a:effectLst/>
-              <a:ea typeface="ＭＳ 明朝"/>
-              <a:cs typeface="Times New Roman"/>
-            </a:endParaRPr>
-          </a:p>
-        </p:txBody>
-      </p:sp>
-      <p:sp>
-        <p:nvSpPr>
-          <p:cNvPr id="16" name="Zylinder 15"/>
-          <p:cNvSpPr/>
-          <p:nvPr/>
-        </p:nvSpPr>
-        <p:spPr>
-          <a:xfrm>
-            <a:off x="6394384" y="4005384"/>
-            <a:ext cx="971062" cy="485531"/>
-          </a:xfrm>
-          <a:prstGeom prst="can">
-            <a:avLst/>
-          </a:prstGeom>
-        </p:spPr>
-        <p:style>
-          <a:lnRef idx="2">
-            <a:schemeClr val="accent1">
-              <a:shade val="50000"/>
-            </a:schemeClr>
-          </a:lnRef>
-          <a:fillRef idx="1">
-            <a:schemeClr val="accent1"/>
-          </a:fillRef>
-          <a:effectRef idx="0">
-            <a:schemeClr val="accent1"/>
-          </a:effectRef>
-          <a:fontRef idx="minor">
-            <a:schemeClr val="lt1"/>
-          </a:fontRef>
-        </p:style>
-        <p:txBody>
-          <a:bodyPr rot="0" spcFirstLastPara="0" vert="horz" wrap="square" lIns="91440" tIns="45720" rIns="91440" bIns="45720" numCol="1" spcCol="0" rtlCol="0" fromWordArt="0" anchor="ctr" anchorCtr="0" forceAA="0" compatLnSpc="1">
-            <a:prstTxWarp prst="textNoShape">
-              <a:avLst/>
-            </a:prstTxWarp>
-            <a:noAutofit/>
-          </a:bodyPr>
-          <a:lstStyle/>
-          <a:p>
-            <a:pPr algn="ctr">
-              <a:spcAft>
-                <a:spcPts val="0"/>
-              </a:spcAft>
-            </a:pPr>
-            <a:r>
-              <a:rPr lang="de-DE" sz="1200" dirty="0" err="1" smtClean="0">
-                <a:effectLst/>
-                <a:ea typeface="ＭＳ 明朝"/>
-                <a:cs typeface="Times New Roman"/>
-              </a:rPr>
-              <a:t>Testset</a:t>
-            </a:r>
-            <a:endParaRPr lang="de-DE" sz="1200" dirty="0">
-              <a:effectLst/>
-              <a:ea typeface="ＭＳ 明朝"/>
-              <a:cs typeface="Times New Roman"/>
-            </a:endParaRPr>
-          </a:p>
-        </p:txBody>
-      </p:sp>
-      <p:sp>
-        <p:nvSpPr>
-          <p:cNvPr id="17" name="Würfel 16"/>
-          <p:cNvSpPr/>
-          <p:nvPr/>
-        </p:nvSpPr>
-        <p:spPr>
-          <a:xfrm>
-            <a:off x="6275416" y="5001846"/>
-            <a:ext cx="1390590" cy="801078"/>
-          </a:xfrm>
-          <a:prstGeom prst="cube">
-            <a:avLst/>
-          </a:prstGeom>
-        </p:spPr>
-        <p:style>
-          <a:lnRef idx="2">
-            <a:schemeClr val="accent6">
-              <a:shade val="50000"/>
-            </a:schemeClr>
-          </a:lnRef>
-          <a:fillRef idx="1">
-            <a:schemeClr val="accent6"/>
-          </a:fillRef>
-          <a:effectRef idx="0">
-            <a:schemeClr val="accent6"/>
-          </a:effectRef>
-          <a:fontRef idx="minor">
-            <a:schemeClr val="lt1"/>
-          </a:fontRef>
-        </p:style>
-        <p:txBody>
-          <a:bodyPr rtlCol="0" anchor="ctr"/>
-          <a:lstStyle/>
-          <a:p>
-            <a:pPr algn="ctr"/>
-            <a:r>
-              <a:rPr lang="de-DE" sz="1200" dirty="0" err="1" smtClean="0">
-                <a:solidFill>
-                  <a:schemeClr val="tx1"/>
-                </a:solidFill>
-              </a:rPr>
-              <a:t>Classifier</a:t>
-            </a:r>
-            <a:endParaRPr lang="de-DE" sz="1200" dirty="0">
-              <a:solidFill>
-                <a:schemeClr val="tx1"/>
-              </a:solidFill>
-            </a:endParaRPr>
-          </a:p>
-        </p:txBody>
-      </p:sp>
-      <p:cxnSp>
-        <p:nvCxnSpPr>
-          <p:cNvPr id="18" name="Gerade Verbindung 17"/>
-          <p:cNvCxnSpPr/>
-          <p:nvPr/>
-        </p:nvCxnSpPr>
-        <p:spPr>
-          <a:xfrm flipV="1">
-            <a:off x="3366842" y="4591228"/>
-            <a:ext cx="0" cy="911292"/>
-          </a:xfrm>
-          <a:prstGeom prst="line">
-            <a:avLst/>
-          </a:prstGeom>
-        </p:spPr>
-        <p:style>
-          <a:lnRef idx="2">
-            <a:schemeClr val="dk1"/>
-          </a:lnRef>
-          <a:fillRef idx="0">
-            <a:schemeClr val="dk1"/>
-          </a:fillRef>
-          <a:effectRef idx="1">
-            <a:schemeClr val="dk1"/>
-          </a:effectRef>
-          <a:fontRef idx="minor">
-            <a:schemeClr val="tx1"/>
-          </a:fontRef>
-        </p:style>
-      </p:cxnSp>
-      <p:cxnSp>
-        <p:nvCxnSpPr>
-          <p:cNvPr id="19" name="Gerade Verbindung mit Pfeil 18"/>
-          <p:cNvCxnSpPr>
-            <a:endCxn id="17" idx="2"/>
-          </p:cNvCxnSpPr>
-          <p:nvPr/>
-        </p:nvCxnSpPr>
-        <p:spPr>
-          <a:xfrm>
-            <a:off x="3366842" y="5502520"/>
-            <a:ext cx="2908574" cy="0"/>
-          </a:xfrm>
-          <a:prstGeom prst="straightConnector1">
-            <a:avLst/>
-          </a:prstGeom>
-          <a:ln>
-            <a:tailEnd type="arrow"/>
-          </a:ln>
-        </p:spPr>
-        <p:style>
-          <a:lnRef idx="2">
-            <a:schemeClr val="dk1"/>
-          </a:lnRef>
-          <a:fillRef idx="0">
-            <a:schemeClr val="dk1"/>
-          </a:fillRef>
-          <a:effectRef idx="1">
-            <a:schemeClr val="dk1"/>
-          </a:effectRef>
-          <a:fontRef idx="minor">
-            <a:schemeClr val="tx1"/>
-          </a:fontRef>
-        </p:style>
-      </p:cxnSp>
-      <p:cxnSp>
-        <p:nvCxnSpPr>
-          <p:cNvPr id="20" name="Gerade Verbindung mit Pfeil 19"/>
-          <p:cNvCxnSpPr>
-            <a:stCxn id="16" idx="3"/>
-            <a:endCxn id="17" idx="1"/>
-          </p:cNvCxnSpPr>
-          <p:nvPr/>
-        </p:nvCxnSpPr>
-        <p:spPr>
-          <a:xfrm flipH="1">
-            <a:off x="6870576" y="4490915"/>
-            <a:ext cx="9339" cy="711201"/>
-          </a:xfrm>
-          <a:prstGeom prst="straightConnector1">
-            <a:avLst/>
-          </a:prstGeom>
-          <a:ln>
-            <a:tailEnd type="arrow"/>
-          </a:ln>
-        </p:spPr>
-        <p:style>
-          <a:lnRef idx="2">
-            <a:schemeClr val="dk1"/>
-          </a:lnRef>
-          <a:fillRef idx="0">
-            <a:schemeClr val="dk1"/>
-          </a:fillRef>
-          <a:effectRef idx="1">
-            <a:schemeClr val="dk1"/>
-          </a:effectRef>
-          <a:fontRef idx="minor">
-            <a:schemeClr val="tx1"/>
-          </a:fontRef>
-        </p:style>
-      </p:cxnSp>
-      <p:sp>
-        <p:nvSpPr>
-          <p:cNvPr id="21" name="Textfeld 20"/>
-          <p:cNvSpPr txBox="1"/>
-          <p:nvPr/>
-        </p:nvSpPr>
-        <p:spPr>
-          <a:xfrm>
-            <a:off x="4057702" y="5215753"/>
-            <a:ext cx="1524000" cy="276999"/>
-          </a:xfrm>
-          <a:prstGeom prst="rect">
-            <a:avLst/>
-          </a:prstGeom>
-          <a:noFill/>
-        </p:spPr>
-        <p:txBody>
-          <a:bodyPr wrap="square" rtlCol="0">
-            <a:spAutoFit/>
-          </a:bodyPr>
-          <a:lstStyle/>
-          <a:p>
-            <a:r>
-              <a:rPr lang="de-DE" sz="1200" dirty="0" err="1" smtClean="0"/>
-              <a:t>train</a:t>
-            </a:r>
-            <a:r>
-              <a:rPr lang="de-DE" sz="1200" dirty="0" smtClean="0"/>
-              <a:t> </a:t>
-            </a:r>
-            <a:r>
-              <a:rPr lang="de-DE" sz="1200" dirty="0" err="1" smtClean="0"/>
-              <a:t>classifier</a:t>
-            </a:r>
-            <a:endParaRPr lang="de-DE" sz="1200" dirty="0"/>
-          </a:p>
-        </p:txBody>
-      </p:sp>
-      <p:sp>
-        <p:nvSpPr>
-          <p:cNvPr id="22" name="Textfeld 21"/>
-          <p:cNvSpPr txBox="1"/>
-          <p:nvPr/>
-        </p:nvSpPr>
-        <p:spPr>
-          <a:xfrm>
-            <a:off x="6894999" y="4569245"/>
-            <a:ext cx="1524000" cy="276999"/>
-          </a:xfrm>
-          <a:prstGeom prst="rect">
-            <a:avLst/>
-          </a:prstGeom>
-          <a:noFill/>
-        </p:spPr>
-        <p:txBody>
-          <a:bodyPr wrap="square" rtlCol="0">
-            <a:spAutoFit/>
-          </a:bodyPr>
-          <a:lstStyle/>
-          <a:p>
-            <a:r>
-              <a:rPr lang="de-DE" sz="1200" dirty="0" err="1"/>
-              <a:t>t</a:t>
-            </a:r>
-            <a:r>
-              <a:rPr lang="de-DE" sz="1200" dirty="0" err="1" smtClean="0"/>
-              <a:t>est</a:t>
-            </a:r>
-            <a:r>
-              <a:rPr lang="de-DE" sz="1200" dirty="0" smtClean="0"/>
-              <a:t> </a:t>
-            </a:r>
-            <a:r>
-              <a:rPr lang="de-DE" sz="1200" dirty="0" err="1" smtClean="0"/>
-              <a:t>classifier</a:t>
-            </a:r>
-            <a:endParaRPr lang="de-DE" sz="1200" dirty="0"/>
-          </a:p>
-        </p:txBody>
-      </p:sp>
-      <p:sp>
-        <p:nvSpPr>
-          <p:cNvPr id="23" name="Rechteck 22"/>
-          <p:cNvSpPr/>
-          <p:nvPr/>
-        </p:nvSpPr>
-        <p:spPr>
-          <a:xfrm>
-            <a:off x="6184620" y="6188809"/>
-            <a:ext cx="1390590" cy="542192"/>
-          </a:xfrm>
-          <a:prstGeom prst="rect">
-            <a:avLst/>
-          </a:prstGeom>
-        </p:spPr>
-        <p:style>
-          <a:lnRef idx="2">
-            <a:schemeClr val="accent5">
-              <a:shade val="50000"/>
-            </a:schemeClr>
-          </a:lnRef>
-          <a:fillRef idx="1">
-            <a:schemeClr val="accent5"/>
-          </a:fillRef>
-          <a:effectRef idx="0">
-            <a:schemeClr val="accent5"/>
-          </a:effectRef>
-          <a:fontRef idx="minor">
-            <a:schemeClr val="lt1"/>
-          </a:fontRef>
-        </p:style>
-        <p:txBody>
-          <a:bodyPr rtlCol="0" anchor="ctr"/>
-          <a:lstStyle/>
-          <a:p>
-            <a:pPr algn="ctr"/>
-            <a:r>
-              <a:rPr lang="de-DE" sz="1200" dirty="0" smtClean="0"/>
-              <a:t>Labels</a:t>
-            </a:r>
-            <a:endParaRPr lang="de-DE" sz="1200" dirty="0"/>
-          </a:p>
-        </p:txBody>
-      </p:sp>
-      <p:cxnSp>
-        <p:nvCxnSpPr>
-          <p:cNvPr id="24" name="Gerade Verbindung mit Pfeil 23"/>
-          <p:cNvCxnSpPr>
-            <a:stCxn id="17" idx="3"/>
-            <a:endCxn id="23" idx="0"/>
-          </p:cNvCxnSpPr>
-          <p:nvPr/>
-        </p:nvCxnSpPr>
-        <p:spPr>
-          <a:xfrm>
-            <a:off x="6870576" y="5802924"/>
-            <a:ext cx="9339" cy="385885"/>
-          </a:xfrm>
-          <a:prstGeom prst="straightConnector1">
-            <a:avLst/>
-          </a:prstGeom>
-          <a:ln>
-            <a:tailEnd type="arrow"/>
-          </a:ln>
-        </p:spPr>
-        <p:style>
-          <a:lnRef idx="2">
-            <a:schemeClr val="dk1"/>
-          </a:lnRef>
-          <a:fillRef idx="0">
-            <a:schemeClr val="dk1"/>
-          </a:fillRef>
-          <a:effectRef idx="1">
-            <a:schemeClr val="dk1"/>
-          </a:effectRef>
-          <a:fontRef idx="minor">
-            <a:schemeClr val="tx1"/>
-          </a:fontRef>
-        </p:style>
-      </p:cxnSp>
-      <p:sp>
-        <p:nvSpPr>
-          <p:cNvPr id="25" name="Rechteck 24"/>
-          <p:cNvSpPr/>
-          <p:nvPr/>
-        </p:nvSpPr>
-        <p:spPr>
-          <a:xfrm>
-            <a:off x="6184352" y="6188809"/>
-            <a:ext cx="1390590" cy="542192"/>
-          </a:xfrm>
-          <a:prstGeom prst="rect">
-            <a:avLst/>
-          </a:prstGeom>
-        </p:spPr>
-        <p:style>
-          <a:lnRef idx="2">
-            <a:schemeClr val="accent5">
-              <a:shade val="50000"/>
-            </a:schemeClr>
-          </a:lnRef>
-          <a:fillRef idx="1">
-            <a:schemeClr val="accent5"/>
-          </a:fillRef>
-          <a:effectRef idx="0">
-            <a:schemeClr val="accent5"/>
-          </a:effectRef>
-          <a:fontRef idx="minor">
-            <a:schemeClr val="lt1"/>
-          </a:fontRef>
-        </p:style>
-        <p:txBody>
-          <a:bodyPr rtlCol="0" anchor="ctr"/>
-          <a:lstStyle/>
-          <a:p>
-            <a:pPr algn="ctr"/>
-            <a:r>
-              <a:rPr lang="de-DE" sz="1200" dirty="0" smtClean="0"/>
-              <a:t>Labels</a:t>
-            </a:r>
-            <a:endParaRPr lang="de-DE" sz="1200" dirty="0"/>
-          </a:p>
-        </p:txBody>
-      </p:sp>
-      <p:cxnSp>
-        <p:nvCxnSpPr>
-          <p:cNvPr id="26" name="Gerade Verbindung mit Pfeil 25"/>
-          <p:cNvCxnSpPr>
-            <a:endCxn id="25" idx="0"/>
-          </p:cNvCxnSpPr>
-          <p:nvPr/>
-        </p:nvCxnSpPr>
-        <p:spPr>
-          <a:xfrm>
-            <a:off x="6870308" y="5802924"/>
-            <a:ext cx="9339" cy="385885"/>
-          </a:xfrm>
-          <a:prstGeom prst="straightConnector1">
-            <a:avLst/>
-          </a:prstGeom>
-          <a:ln>
-            <a:tailEnd type="arrow"/>
-          </a:ln>
-        </p:spPr>
-        <p:style>
-          <a:lnRef idx="2">
-            <a:schemeClr val="dk1"/>
-          </a:lnRef>
-          <a:fillRef idx="0">
-            <a:schemeClr val="dk1"/>
-          </a:fillRef>
-          <a:effectRef idx="1">
-            <a:schemeClr val="dk1"/>
-          </a:effectRef>
-          <a:fontRef idx="minor">
-            <a:schemeClr val="tx1"/>
-          </a:fontRef>
-        </p:style>
-      </p:cxnSp>
-    </p:spTree>
-    <p:extLst>
-      <p:ext uri="{BB962C8B-B14F-4D97-AF65-F5344CB8AC3E}">
-        <p14:creationId xmlns:p14="http://schemas.microsoft.com/office/powerpoint/2010/main" val="1533815703"/>
-      </p:ext>
-    </p:extLst>
-  </p:cSld>
-  <p:clrMapOvr>
-    <a:masterClrMapping/>
-  </p:clrMapOvr>
-  <mc:AlternateContent xmlns:mc="http://schemas.openxmlformats.org/markup-compatibility/2006">
-    <mc:Choice xmlns:p14="http://schemas.microsoft.com/office/powerpoint/2010/main" Requires="p14">
-      <p:transition spd="slow" p14:dur="2000"/>
-    </mc:Choice>
-    <mc:Fallback>
-      <p:transition xmlns:p14="http://schemas.microsoft.com/office/powerpoint/2010/main" spd="slow"/>
-    </mc:Fallback>
-  </mc:AlternateContent>
-  <p:timing>
-    <p:tnLst>
-      <p:par>
-        <p:cTn xmlns:p14="http://schemas.microsoft.com/office/powerpoint/2010/main" id="1" dur="indefinite" restart="never" nodeType="tmRoot">
-          <p:childTnLst>
-            <p:seq concurrent="1" nextAc="seek">
-              <p:cTn id="2" dur="indefinite" nodeType="mainSeq">
-                <p:childTnLst>
-                  <p:par>
-                    <p:cTn id="3" fill="hold">
-                      <p:stCondLst>
-                        <p:cond delay="indefinite"/>
-                        <p:cond evt="onBegin" delay="0">
-                          <p:tn val="2"/>
-                        </p:cond>
-                      </p:stCondLst>
-                      <p:childTnLst>
-                        <p:par>
-                          <p:cTn id="4" fill="hold">
-                            <p:stCondLst>
-                              <p:cond delay="0"/>
-                            </p:stCondLst>
-                            <p:childTnLst>
-                              <p:par>
-                                <p:cTn id="5" presetID="9" presetClass="emph" presetSubtype="0" nodeType="withEffect">
-                                  <p:stCondLst>
-                                    <p:cond delay="0"/>
-                                  </p:stCondLst>
-                                  <p:childTnLst>
-                                    <p:set>
-                                      <p:cBhvr rctx="PPT">
-                                        <p:cTn id="6" dur="indefinite"/>
-                                        <p:tgtEl>
-                                          <p:spTgt spid="24"/>
-                                        </p:tgtEl>
-                                        <p:attrNameLst>
-                                          <p:attrName>style.opacity</p:attrName>
-                                        </p:attrNameLst>
-                                      </p:cBhvr>
-                                      <p:to>
-                                        <p:strVal val="0.5"/>
-                                      </p:to>
-                                    </p:set>
-                                    <p:animEffect filter="image" prLst="opacity: 0.5">
-                                      <p:cBhvr rctx="IE">
-                                        <p:cTn id="7" dur="indefinite"/>
-                                        <p:tgtEl>
-                                          <p:spTgt spid="24"/>
-                                        </p:tgtEl>
-                                      </p:cBhvr>
-                                    </p:animEffect>
-                                  </p:childTnLst>
-                                </p:cTn>
-                              </p:par>
-                              <p:par>
-                                <p:cTn id="8" presetID="9" presetClass="emph" presetSubtype="0" grpId="0" nodeType="withEffect">
-                                  <p:stCondLst>
-                                    <p:cond delay="0"/>
-                                  </p:stCondLst>
-                                  <p:childTnLst>
-                                    <p:set>
-                                      <p:cBhvr rctx="PPT">
-                                        <p:cTn id="9" dur="indefinite"/>
-                                        <p:tgtEl>
-                                          <p:spTgt spid="23"/>
-                                        </p:tgtEl>
-                                        <p:attrNameLst>
-                                          <p:attrName>style.opacity</p:attrName>
-                                        </p:attrNameLst>
-                                      </p:cBhvr>
-                                      <p:to>
-                                        <p:strVal val="0.5"/>
-                                      </p:to>
-                                    </p:set>
-                                    <p:animEffect filter="image" prLst="opacity: 0.5">
-                                      <p:cBhvr rctx="IE">
-                                        <p:cTn id="10" dur="indefinite"/>
-                                        <p:tgtEl>
-                                          <p:spTgt spid="23"/>
-                                        </p:tgtEl>
-                                      </p:cBhvr>
-                                    </p:animEffect>
-                                  </p:childTnLst>
-                                </p:cTn>
-                              </p:par>
-                              <p:par>
-                                <p:cTn id="11" presetID="1" presetClass="exit" presetSubtype="0" fill="hold" grpId="0" nodeType="withEffect">
-                                  <p:stCondLst>
-                                    <p:cond delay="0"/>
-                                  </p:stCondLst>
-                                  <p:childTnLst>
-                                    <p:set>
-                                      <p:cBhvr>
-                                        <p:cTn id="12" dur="1" fill="hold">
-                                          <p:stCondLst>
-                                            <p:cond delay="0"/>
-                                          </p:stCondLst>
-                                        </p:cTn>
-                                        <p:tgtEl>
-                                          <p:spTgt spid="25"/>
-                                        </p:tgtEl>
-                                        <p:attrNameLst>
-                                          <p:attrName>style.visibility</p:attrName>
-                                        </p:attrNameLst>
-                                      </p:cBhvr>
-                                      <p:to>
-                                        <p:strVal val="hidden"/>
-                                      </p:to>
-                                    </p:set>
-                                  </p:childTnLst>
-                                </p:cTn>
-                              </p:par>
-                              <p:par>
-                                <p:cTn id="13" presetID="1" presetClass="exit" presetSubtype="0" fill="hold" nodeType="withEffect">
-                                  <p:stCondLst>
-                                    <p:cond delay="0"/>
-                                  </p:stCondLst>
-                                  <p:childTnLst>
-                                    <p:set>
-                                      <p:cBhvr>
-                                        <p:cTn id="14" dur="1" fill="hold">
-                                          <p:stCondLst>
-                                            <p:cond delay="0"/>
-                                          </p:stCondLst>
-                                        </p:cTn>
-                                        <p:tgtEl>
-                                          <p:spTgt spid="26"/>
-                                        </p:tgtEl>
-                                        <p:attrNameLst>
-                                          <p:attrName>style.visibility</p:attrName>
-                                        </p:attrNameLst>
-                                      </p:cBhvr>
-                                      <p:to>
-                                        <p:strVal val="hidden"/>
-                                      </p:to>
-                                    </p:set>
-                                  </p:childTnLst>
-                                </p:cTn>
-                              </p:par>
-                            </p:childTnLst>
-                          </p:cTn>
-                        </p:par>
-                      </p:childTnLst>
-                    </p:cTn>
-                  </p:par>
-                  <p:par>
-                    <p:cTn id="15" fill="hold">
-                      <p:stCondLst>
-                        <p:cond delay="indefinite"/>
-                      </p:stCondLst>
-                      <p:childTnLst>
-                        <p:par>
-                          <p:cTn id="16" fill="hold">
-                            <p:stCondLst>
-                              <p:cond delay="0"/>
-                            </p:stCondLst>
-                            <p:childTnLst>
-                              <p:par>
-                                <p:cTn id="17" presetID="1" presetClass="entr" presetSubtype="0" fill="hold" grpId="1" nodeType="clickEffect">
-                                  <p:stCondLst>
-                                    <p:cond delay="0"/>
-                                  </p:stCondLst>
-                                  <p:childTnLst>
-                                    <p:set>
-                                      <p:cBhvr>
-                                        <p:cTn id="18" dur="1" fill="hold">
-                                          <p:stCondLst>
-                                            <p:cond delay="0"/>
-                                          </p:stCondLst>
-                                        </p:cTn>
-                                        <p:tgtEl>
-                                          <p:spTgt spid="25"/>
-                                        </p:tgtEl>
-                                        <p:attrNameLst>
-                                          <p:attrName>style.visibility</p:attrName>
-                                        </p:attrNameLst>
-                                      </p:cBhvr>
-                                      <p:to>
-                                        <p:strVal val="visible"/>
-                                      </p:to>
-                                    </p:set>
-                                  </p:childTnLst>
-                                </p:cTn>
-                              </p:par>
-                              <p:par>
-                                <p:cTn id="19" presetID="1" presetClass="entr" presetSubtype="0" fill="hold" nodeType="withEffect">
-                                  <p:stCondLst>
-                                    <p:cond delay="0"/>
-                                  </p:stCondLst>
-                                  <p:childTnLst>
-                                    <p:set>
-                                      <p:cBhvr>
-                                        <p:cTn id="20" dur="1" fill="hold">
-                                          <p:stCondLst>
-                                            <p:cond delay="0"/>
-                                          </p:stCondLst>
-                                        </p:cTn>
-                                        <p:tgtEl>
-                                          <p:spTgt spid="26"/>
-                                        </p:tgtEl>
-                                        <p:attrNameLst>
-                                          <p:attrName>style.visibility</p:attrName>
-                                        </p:attrNameLst>
-                                      </p:cBhvr>
-                                      <p:to>
-                                        <p:strVal val="visible"/>
-                                      </p:to>
-                                    </p:set>
-                                  </p:childTnLst>
-                                </p:cTn>
-                              </p:par>
-                            </p:childTnLst>
-                          </p:cTn>
-                        </p:par>
-                      </p:childTnLst>
-                    </p:cTn>
-                  </p:par>
-                </p:childTnLst>
-              </p:cTn>
-              <p:prevCondLst>
-                <p:cond evt="onPrev" delay="0">
-                  <p:tgtEl>
-                    <p:sldTgt/>
-                  </p:tgtEl>
-                </p:cond>
-              </p:prevCondLst>
-              <p:nextCondLst>
-                <p:cond evt="onNext" delay="0">
-                  <p:tgtEl>
-                    <p:sldTgt/>
-                  </p:tgtEl>
-                </p:cond>
-              </p:nextCondLst>
-            </p:seq>
-          </p:childTnLst>
-        </p:cTn>
-      </p:par>
-    </p:tnLst>
-    <p:bldLst>
-      <p:bldP spid="23" grpId="0" animBg="1"/>
-      <p:bldP spid="25" grpId="0" animBg="1"/>
-      <p:bldP spid="25" grpId="1" animBg="1"/>
-    </p:bldLst>
-  </p:timing>
-</p:sld>
-</file>
-
-<file path=ppt/slides/slide12.xml><?xml version="1.0" encoding="utf-8"?>
 <p:sld xmlns:a="http://schemas.openxmlformats.org/drawingml/2006/main" xmlns:r="http://schemas.openxmlformats.org/officeDocument/2006/relationships" xmlns:p="http://schemas.openxmlformats.org/presentationml/2006/main">
   <p:cSld>
     <p:spTree>
@@ -9227,7 +7925,7 @@
           <a:p>
             <a:fld id="{C01938AF-F9EA-434A-A4EB-30D6D6E13CD1}" type="slidenum">
               <a:rPr lang="de-DE" smtClean="0"/>
-              <a:t>12</a:t>
+              <a:t>11</a:t>
             </a:fld>
             <a:endParaRPr lang="de-DE"/>
           </a:p>
@@ -9253,7 +7951,7 @@
 </p:sld>
 </file>
 
-<file path=ppt/slides/slide13.xml><?xml version="1.0" encoding="utf-8"?>
+<file path=ppt/slides/slide12.xml><?xml version="1.0" encoding="utf-8"?>
 <p:sld xmlns:a="http://schemas.openxmlformats.org/drawingml/2006/main" xmlns:r="http://schemas.openxmlformats.org/officeDocument/2006/relationships" xmlns:p="http://schemas.openxmlformats.org/presentationml/2006/main">
   <p:cSld>
     <p:spTree>
@@ -9360,7 +8058,7 @@
           <a:p>
             <a:fld id="{C01938AF-F9EA-434A-A4EB-30D6D6E13CD1}" type="slidenum">
               <a:rPr lang="de-DE" smtClean="0"/>
-              <a:t>13</a:t>
+              <a:t>12</a:t>
             </a:fld>
             <a:endParaRPr lang="de-DE"/>
           </a:p>
@@ -9411,7 +8109,7 @@
 </p:sld>
 </file>
 
-<file path=ppt/slides/slide14.xml><?xml version="1.0" encoding="utf-8"?>
+<file path=ppt/slides/slide13.xml><?xml version="1.0" encoding="utf-8"?>
 <p:sld xmlns:a="http://schemas.openxmlformats.org/drawingml/2006/main" xmlns:r="http://schemas.openxmlformats.org/officeDocument/2006/relationships" xmlns:p="http://schemas.openxmlformats.org/presentationml/2006/main">
   <p:cSld>
     <p:spTree>
@@ -9691,7 +8389,7 @@
           <a:p>
             <a:fld id="{C01938AF-F9EA-434A-A4EB-30D6D6E13CD1}" type="slidenum">
               <a:rPr lang="de-DE" smtClean="0"/>
-              <a:t>14</a:t>
+              <a:t>13</a:t>
             </a:fld>
             <a:endParaRPr lang="de-DE"/>
           </a:p>
@@ -9717,7 +8415,7 @@
 </p:sld>
 </file>
 
-<file path=ppt/slides/slide15.xml><?xml version="1.0" encoding="utf-8"?>
+<file path=ppt/slides/slide14.xml><?xml version="1.0" encoding="utf-8"?>
 <p:sld xmlns:a="http://schemas.openxmlformats.org/drawingml/2006/main" xmlns:r="http://schemas.openxmlformats.org/officeDocument/2006/relationships" xmlns:p="http://schemas.openxmlformats.org/presentationml/2006/main">
   <p:cSld>
     <p:spTree>
@@ -9984,7 +8682,7 @@
           <a:p>
             <a:fld id="{C01938AF-F9EA-434A-A4EB-30D6D6E13CD1}" type="slidenum">
               <a:rPr lang="de-DE" smtClean="0"/>
-              <a:t>15</a:t>
+              <a:t>14</a:t>
             </a:fld>
             <a:endParaRPr lang="de-DE"/>
           </a:p>
@@ -10228,6 +8926,132 @@
 </p:sld>
 </file>
 
+<file path=ppt/slides/slide15.xml><?xml version="1.0" encoding="utf-8"?>
+<p:sld xmlns:a="http://schemas.openxmlformats.org/drawingml/2006/main" xmlns:r="http://schemas.openxmlformats.org/officeDocument/2006/relationships" xmlns:p="http://schemas.openxmlformats.org/presentationml/2006/main">
+  <p:cSld>
+    <p:spTree>
+      <p:nvGrpSpPr>
+        <p:cNvPr id="1" name=""/>
+        <p:cNvGrpSpPr/>
+        <p:nvPr/>
+      </p:nvGrpSpPr>
+      <p:grpSpPr>
+        <a:xfrm>
+          <a:off x="0" y="0"/>
+          <a:ext cx="0" cy="0"/>
+          <a:chOff x="0" y="0"/>
+          <a:chExt cx="0" cy="0"/>
+        </a:xfrm>
+      </p:grpSpPr>
+      <p:sp>
+        <p:nvSpPr>
+          <p:cNvPr id="2" name="Titel 1"/>
+          <p:cNvSpPr>
+            <a:spLocks noGrp="1"/>
+          </p:cNvSpPr>
+          <p:nvPr>
+            <p:ph type="title"/>
+          </p:nvPr>
+        </p:nvSpPr>
+        <p:spPr/>
+        <p:txBody>
+          <a:bodyPr/>
+          <a:lstStyle/>
+          <a:p>
+            <a:r>
+              <a:rPr lang="de-DE" dirty="0" err="1" smtClean="0"/>
+              <a:t>Questions</a:t>
+            </a:r>
+            <a:r>
+              <a:rPr lang="de-DE" dirty="0" smtClean="0"/>
+              <a:t>?</a:t>
+            </a:r>
+            <a:endParaRPr lang="de-DE" dirty="0"/>
+          </a:p>
+        </p:txBody>
+      </p:sp>
+      <p:sp>
+        <p:nvSpPr>
+          <p:cNvPr id="4" name="Datumsplatzhalter 3"/>
+          <p:cNvSpPr>
+            <a:spLocks noGrp="1"/>
+          </p:cNvSpPr>
+          <p:nvPr>
+            <p:ph type="dt" sz="half" idx="10"/>
+          </p:nvPr>
+        </p:nvSpPr>
+        <p:spPr/>
+        <p:txBody>
+          <a:bodyPr/>
+          <a:lstStyle/>
+          <a:p>
+            <a:fld id="{2D4733B8-70C3-6141-8B66-0EF5CA422C2F}" type="datetime5">
+              <a:rPr lang="de-DE" smtClean="0"/>
+              <a:t>19-Okt-15</a:t>
+            </a:fld>
+            <a:endParaRPr lang="de-DE"/>
+          </a:p>
+        </p:txBody>
+      </p:sp>
+      <p:sp>
+        <p:nvSpPr>
+          <p:cNvPr id="5" name="Fußzeilenplatzhalter 4"/>
+          <p:cNvSpPr>
+            <a:spLocks noGrp="1"/>
+          </p:cNvSpPr>
+          <p:nvPr>
+            <p:ph type="ftr" sz="quarter" idx="11"/>
+          </p:nvPr>
+        </p:nvSpPr>
+        <p:spPr/>
+        <p:txBody>
+          <a:bodyPr/>
+          <a:lstStyle/>
+          <a:p>
+            <a:r>
+              <a:rPr lang="de-DE" smtClean="0"/>
+              <a:t>A. Patel, C. Kaiser, L. Schmitz, N. Tatarakis </a:t>
+            </a:r>
+            <a:endParaRPr lang="de-DE"/>
+          </a:p>
+        </p:txBody>
+      </p:sp>
+      <p:sp>
+        <p:nvSpPr>
+          <p:cNvPr id="6" name="Foliennummernplatzhalter 5"/>
+          <p:cNvSpPr>
+            <a:spLocks noGrp="1"/>
+          </p:cNvSpPr>
+          <p:nvPr>
+            <p:ph type="sldNum" sz="quarter" idx="12"/>
+          </p:nvPr>
+        </p:nvSpPr>
+        <p:spPr/>
+        <p:txBody>
+          <a:bodyPr/>
+          <a:lstStyle/>
+          <a:p>
+            <a:fld id="{C01938AF-F9EA-434A-A4EB-30D6D6E13CD1}" type="slidenum">
+              <a:rPr lang="de-DE" smtClean="0"/>
+              <a:t>15</a:t>
+            </a:fld>
+            <a:endParaRPr lang="de-DE"/>
+          </a:p>
+        </p:txBody>
+      </p:sp>
+    </p:spTree>
+    <p:extLst>
+      <p:ext uri="{BB962C8B-B14F-4D97-AF65-F5344CB8AC3E}">
+        <p14:creationId xmlns:p14="http://schemas.microsoft.com/office/powerpoint/2010/main" val="2193966775"/>
+      </p:ext>
+    </p:extLst>
+  </p:cSld>
+  <p:clrMapOvr>
+    <a:masterClrMapping/>
+  </p:clrMapOvr>
+</p:sld>
+</file>
+
 <file path=ppt/slides/slide16.xml><?xml version="1.0" encoding="utf-8"?>
 <p:sld xmlns:a="http://schemas.openxmlformats.org/drawingml/2006/main" xmlns:r="http://schemas.openxmlformats.org/officeDocument/2006/relationships" xmlns:p="http://schemas.openxmlformats.org/presentationml/2006/main">
   <p:cSld>
@@ -10257,17 +9081,877 @@
         </p:nvSpPr>
         <p:spPr/>
         <p:txBody>
-          <a:bodyPr/>
-          <a:lstStyle/>
+          <a:bodyPr>
+            <a:normAutofit/>
+          </a:bodyPr>
+          <a:lstStyle/>
+          <a:p>
+            <a:r>
+              <a:rPr lang="de-DE" dirty="0" smtClean="0"/>
+              <a:t>References</a:t>
+            </a:r>
+            <a:endParaRPr lang="de-DE" dirty="0"/>
+          </a:p>
+        </p:txBody>
+      </p:sp>
+      <p:sp>
+        <p:nvSpPr>
+          <p:cNvPr id="3" name="Inhaltsplatzhalter 2"/>
+          <p:cNvSpPr>
+            <a:spLocks noGrp="1"/>
+          </p:cNvSpPr>
+          <p:nvPr>
+            <p:ph idx="1"/>
+          </p:nvPr>
+        </p:nvSpPr>
+        <p:spPr/>
+        <p:txBody>
+          <a:bodyPr>
+            <a:normAutofit fontScale="47500" lnSpcReduction="20000"/>
+          </a:bodyPr>
+          <a:lstStyle/>
+          <a:p>
+            <a:r>
+              <a:rPr lang="de-DE" dirty="0"/>
+              <a:t>XHJS </a:t>
+            </a:r>
+            <a:r>
+              <a:rPr lang="de-DE" dirty="0" err="1"/>
+              <a:t>Downie</a:t>
+            </a:r>
+            <a:r>
+              <a:rPr lang="de-DE" dirty="0"/>
+              <a:t>, Cyril Laurier, </a:t>
+            </a:r>
+            <a:r>
+              <a:rPr lang="de-DE" dirty="0" err="1"/>
+              <a:t>and</a:t>
+            </a:r>
+            <a:r>
+              <a:rPr lang="de-DE" dirty="0"/>
+              <a:t> MBAF Ehmann. The 2007 </a:t>
+            </a:r>
+            <a:r>
+              <a:rPr lang="de-DE" dirty="0" err="1"/>
+              <a:t>mirex</a:t>
+            </a:r>
+            <a:r>
+              <a:rPr lang="de-DE" dirty="0"/>
+              <a:t> au- </a:t>
+            </a:r>
+            <a:r>
+              <a:rPr lang="de-DE" dirty="0" err="1"/>
+              <a:t>dio</a:t>
+            </a:r>
+            <a:r>
+              <a:rPr lang="de-DE" dirty="0"/>
+              <a:t> </a:t>
+            </a:r>
+            <a:r>
+              <a:rPr lang="de-DE" dirty="0" err="1"/>
+              <a:t>mood</a:t>
+            </a:r>
+            <a:r>
+              <a:rPr lang="de-DE" dirty="0"/>
+              <a:t> </a:t>
+            </a:r>
+            <a:r>
+              <a:rPr lang="de-DE" dirty="0" err="1"/>
+              <a:t>classification</a:t>
+            </a:r>
+            <a:r>
+              <a:rPr lang="de-DE" dirty="0"/>
+              <a:t> </a:t>
+            </a:r>
+            <a:r>
+              <a:rPr lang="de-DE" dirty="0" err="1"/>
+              <a:t>task</a:t>
+            </a:r>
+            <a:r>
+              <a:rPr lang="de-DE" dirty="0"/>
+              <a:t>: </a:t>
+            </a:r>
+            <a:r>
+              <a:rPr lang="de-DE" dirty="0" err="1"/>
+              <a:t>Lessons</a:t>
+            </a:r>
+            <a:r>
+              <a:rPr lang="de-DE" dirty="0"/>
+              <a:t> </a:t>
+            </a:r>
+            <a:r>
+              <a:rPr lang="de-DE" dirty="0" err="1"/>
+              <a:t>learned</a:t>
+            </a:r>
+            <a:r>
+              <a:rPr lang="de-DE" dirty="0"/>
+              <a:t>. In ISMIR 2008: </a:t>
+            </a:r>
+            <a:r>
+              <a:rPr lang="de-DE" dirty="0" err="1"/>
+              <a:t>Proceed</a:t>
+            </a:r>
+            <a:r>
+              <a:rPr lang="de-DE" dirty="0"/>
+              <a:t>- </a:t>
+            </a:r>
+            <a:r>
+              <a:rPr lang="de-DE" dirty="0" err="1"/>
+              <a:t>ings</a:t>
+            </a:r>
+            <a:r>
+              <a:rPr lang="de-DE" dirty="0"/>
+              <a:t> </a:t>
+            </a:r>
+            <a:r>
+              <a:rPr lang="de-DE" dirty="0" err="1"/>
+              <a:t>of</a:t>
+            </a:r>
+            <a:r>
+              <a:rPr lang="de-DE" dirty="0"/>
+              <a:t> </a:t>
+            </a:r>
+            <a:r>
+              <a:rPr lang="de-DE" dirty="0" err="1"/>
+              <a:t>the</a:t>
+            </a:r>
+            <a:r>
+              <a:rPr lang="de-DE" dirty="0"/>
+              <a:t> 9th International Conference </a:t>
+            </a:r>
+            <a:r>
+              <a:rPr lang="de-DE" dirty="0" err="1"/>
+              <a:t>of</a:t>
+            </a:r>
+            <a:r>
+              <a:rPr lang="de-DE" dirty="0"/>
+              <a:t> Music Information </a:t>
+            </a:r>
+            <a:r>
+              <a:rPr lang="de-DE" dirty="0" err="1"/>
+              <a:t>Retrieval</a:t>
+            </a:r>
+            <a:r>
+              <a:rPr lang="de-DE" dirty="0"/>
+              <a:t>, </a:t>
+            </a:r>
+            <a:r>
+              <a:rPr lang="de-DE" dirty="0" err="1"/>
+              <a:t>page</a:t>
+            </a:r>
+            <a:r>
+              <a:rPr lang="de-DE" dirty="0"/>
+              <a:t> 462. Lulu. </a:t>
+            </a:r>
+            <a:r>
+              <a:rPr lang="de-DE" dirty="0" err="1"/>
+              <a:t>com</a:t>
+            </a:r>
+            <a:r>
+              <a:rPr lang="de-DE" dirty="0"/>
+              <a:t>, 2008. </a:t>
+            </a:r>
+          </a:p>
           <a:p>
             <a:r>
               <a:rPr lang="de-DE" dirty="0" err="1" smtClean="0"/>
-              <a:t>Questions</a:t>
+              <a:t>Youngmoo</a:t>
             </a:r>
             <a:r>
               <a:rPr lang="de-DE" dirty="0" smtClean="0"/>
-              <a:t>?</a:t>
-            </a:r>
+              <a:t> </a:t>
+            </a:r>
+            <a:r>
+              <a:rPr lang="de-DE" dirty="0"/>
+              <a:t>E Kim, Erik M Schmidt, Raymond </a:t>
+            </a:r>
+            <a:r>
+              <a:rPr lang="de-DE" dirty="0" err="1"/>
+              <a:t>Migneco</a:t>
+            </a:r>
+            <a:r>
+              <a:rPr lang="de-DE" dirty="0"/>
+              <a:t>, Brandon G Morton, Patrick Richardson, Jeffrey Scott, </a:t>
+            </a:r>
+            <a:r>
+              <a:rPr lang="de-DE" dirty="0" err="1"/>
+              <a:t>Jacquelin</a:t>
+            </a:r>
+            <a:r>
+              <a:rPr lang="de-DE" dirty="0"/>
+              <a:t> A Speck, </a:t>
+            </a:r>
+            <a:r>
+              <a:rPr lang="de-DE" dirty="0" err="1"/>
+              <a:t>and</a:t>
+            </a:r>
+            <a:r>
+              <a:rPr lang="de-DE" dirty="0"/>
+              <a:t> Dou- glas </a:t>
+            </a:r>
+            <a:r>
+              <a:rPr lang="de-DE" dirty="0" err="1"/>
+              <a:t>Turnbull</a:t>
+            </a:r>
+            <a:r>
+              <a:rPr lang="de-DE" dirty="0"/>
+              <a:t>. Music </a:t>
+            </a:r>
+            <a:r>
+              <a:rPr lang="de-DE" dirty="0" err="1"/>
+              <a:t>emotion</a:t>
+            </a:r>
+            <a:r>
+              <a:rPr lang="de-DE" dirty="0"/>
+              <a:t> </a:t>
+            </a:r>
+            <a:r>
+              <a:rPr lang="de-DE" dirty="0" err="1"/>
+              <a:t>recognition</a:t>
+            </a:r>
+            <a:r>
+              <a:rPr lang="de-DE" dirty="0"/>
+              <a:t>: A </a:t>
+            </a:r>
+            <a:r>
+              <a:rPr lang="de-DE" dirty="0" err="1"/>
+              <a:t>state</a:t>
+            </a:r>
+            <a:r>
+              <a:rPr lang="de-DE" dirty="0"/>
+              <a:t> </a:t>
+            </a:r>
+            <a:r>
+              <a:rPr lang="de-DE" dirty="0" err="1"/>
+              <a:t>of</a:t>
+            </a:r>
+            <a:r>
+              <a:rPr lang="de-DE" dirty="0"/>
+              <a:t> </a:t>
+            </a:r>
+            <a:r>
+              <a:rPr lang="de-DE" dirty="0" err="1"/>
+              <a:t>the</a:t>
+            </a:r>
+            <a:r>
+              <a:rPr lang="de-DE" dirty="0"/>
+              <a:t> </a:t>
+            </a:r>
+            <a:r>
+              <a:rPr lang="de-DE" dirty="0" err="1"/>
+              <a:t>art</a:t>
+            </a:r>
+            <a:r>
+              <a:rPr lang="de-DE" dirty="0"/>
+              <a:t> </a:t>
+            </a:r>
+            <a:r>
+              <a:rPr lang="de-DE" dirty="0" err="1"/>
+              <a:t>review</a:t>
+            </a:r>
+            <a:r>
+              <a:rPr lang="de-DE" dirty="0"/>
+              <a:t>. In </a:t>
+            </a:r>
+            <a:r>
+              <a:rPr lang="de-DE" dirty="0" err="1"/>
+              <a:t>Proc</a:t>
+            </a:r>
+            <a:r>
+              <a:rPr lang="de-DE" dirty="0"/>
+              <a:t>. ISMIR, </a:t>
+            </a:r>
+            <a:r>
+              <a:rPr lang="de-DE" dirty="0" err="1"/>
+              <a:t>pages</a:t>
+            </a:r>
+            <a:r>
+              <a:rPr lang="de-DE" dirty="0"/>
+              <a:t> 255–266. </a:t>
+            </a:r>
+            <a:r>
+              <a:rPr lang="de-DE" dirty="0" err="1"/>
+              <a:t>Citeseer</a:t>
+            </a:r>
+            <a:r>
+              <a:rPr lang="de-DE" dirty="0"/>
+              <a:t>, 2010. </a:t>
+            </a:r>
+          </a:p>
+          <a:p>
+            <a:r>
+              <a:rPr lang="de-DE" dirty="0" smtClean="0"/>
+              <a:t>Yong </a:t>
+            </a:r>
+            <a:r>
+              <a:rPr lang="de-DE" dirty="0"/>
+              <a:t>H Li </a:t>
+            </a:r>
+            <a:r>
+              <a:rPr lang="de-DE" dirty="0" err="1"/>
+              <a:t>and</a:t>
+            </a:r>
+            <a:r>
+              <a:rPr lang="de-DE" dirty="0"/>
+              <a:t> Anil K. Jain. </a:t>
+            </a:r>
+            <a:r>
+              <a:rPr lang="de-DE" dirty="0" err="1"/>
+              <a:t>Classification</a:t>
+            </a:r>
+            <a:r>
+              <a:rPr lang="de-DE" dirty="0"/>
+              <a:t> </a:t>
+            </a:r>
+            <a:r>
+              <a:rPr lang="de-DE" dirty="0" err="1"/>
+              <a:t>of</a:t>
+            </a:r>
+            <a:r>
+              <a:rPr lang="de-DE" dirty="0"/>
+              <a:t> </a:t>
+            </a:r>
+            <a:r>
+              <a:rPr lang="de-DE" dirty="0" err="1"/>
+              <a:t>text</a:t>
+            </a:r>
+            <a:r>
+              <a:rPr lang="de-DE" dirty="0"/>
+              <a:t> </a:t>
+            </a:r>
+            <a:r>
+              <a:rPr lang="de-DE" dirty="0" err="1"/>
+              <a:t>documents</a:t>
+            </a:r>
+            <a:r>
+              <a:rPr lang="de-DE" dirty="0"/>
+              <a:t>. The Computer Journal, 41(8):537–546, 1998. </a:t>
+            </a:r>
+          </a:p>
+          <a:p>
+            <a:r>
+              <a:rPr lang="de-DE" dirty="0" smtClean="0"/>
+              <a:t>Thomas </a:t>
+            </a:r>
+            <a:r>
+              <a:rPr lang="de-DE" dirty="0"/>
+              <a:t>M. Mitchell. </a:t>
+            </a:r>
+            <a:r>
+              <a:rPr lang="de-DE" dirty="0" err="1"/>
+              <a:t>Machine</a:t>
+            </a:r>
+            <a:r>
+              <a:rPr lang="de-DE" dirty="0"/>
+              <a:t> Learning. McGraw-Hill, Inc., New York, NY, USA, 1 </a:t>
+            </a:r>
+            <a:r>
+              <a:rPr lang="de-DE" dirty="0" err="1"/>
+              <a:t>edition</a:t>
+            </a:r>
+            <a:r>
+              <a:rPr lang="de-DE" dirty="0"/>
+              <a:t>, 1997. </a:t>
+            </a:r>
+            <a:endParaRPr lang="de-DE" dirty="0" smtClean="0"/>
+          </a:p>
+          <a:p>
+            <a:r>
+              <a:rPr lang="de-DE" dirty="0" smtClean="0"/>
+              <a:t>Jason </a:t>
+            </a:r>
+            <a:r>
+              <a:rPr lang="de-DE" dirty="0"/>
+              <a:t>D </a:t>
+            </a:r>
+            <a:r>
+              <a:rPr lang="de-DE" dirty="0" err="1"/>
+              <a:t>Rennie</a:t>
+            </a:r>
+            <a:r>
+              <a:rPr lang="de-DE" dirty="0"/>
+              <a:t>, Lawrence </a:t>
+            </a:r>
+            <a:r>
+              <a:rPr lang="de-DE" dirty="0" err="1"/>
+              <a:t>Shih</a:t>
+            </a:r>
+            <a:r>
+              <a:rPr lang="de-DE" dirty="0"/>
+              <a:t>, Jaime </a:t>
+            </a:r>
+            <a:r>
+              <a:rPr lang="de-DE" dirty="0" err="1"/>
+              <a:t>Teevan</a:t>
+            </a:r>
+            <a:r>
+              <a:rPr lang="de-DE" dirty="0"/>
+              <a:t>, David R Karger, et al. Tackling </a:t>
+            </a:r>
+            <a:r>
+              <a:rPr lang="de-DE" dirty="0" err="1"/>
+              <a:t>the</a:t>
+            </a:r>
+            <a:r>
+              <a:rPr lang="de-DE" dirty="0"/>
+              <a:t> </a:t>
+            </a:r>
+            <a:r>
+              <a:rPr lang="de-DE" dirty="0" err="1"/>
+              <a:t>poor</a:t>
+            </a:r>
+            <a:r>
+              <a:rPr lang="de-DE" dirty="0"/>
+              <a:t> </a:t>
+            </a:r>
+            <a:r>
+              <a:rPr lang="de-DE" dirty="0" err="1"/>
+              <a:t>assumptions</a:t>
+            </a:r>
+            <a:r>
+              <a:rPr lang="de-DE" dirty="0"/>
+              <a:t> </a:t>
+            </a:r>
+            <a:r>
+              <a:rPr lang="de-DE" dirty="0" err="1"/>
+              <a:t>of</a:t>
+            </a:r>
+            <a:r>
+              <a:rPr lang="de-DE" dirty="0"/>
+              <a:t> naive </a:t>
+            </a:r>
+            <a:r>
+              <a:rPr lang="de-DE" dirty="0" err="1"/>
+              <a:t>bayes</a:t>
+            </a:r>
+            <a:r>
+              <a:rPr lang="de-DE" dirty="0"/>
+              <a:t> </a:t>
+            </a:r>
+            <a:r>
+              <a:rPr lang="de-DE" dirty="0" err="1"/>
+              <a:t>text</a:t>
+            </a:r>
+            <a:r>
+              <a:rPr lang="de-DE" dirty="0"/>
+              <a:t> </a:t>
+            </a:r>
+            <a:r>
+              <a:rPr lang="de-DE" dirty="0" err="1"/>
+              <a:t>classifiers</a:t>
+            </a:r>
+            <a:r>
+              <a:rPr lang="de-DE" dirty="0"/>
+              <a:t>. In ICML, </a:t>
+            </a:r>
+            <a:r>
+              <a:rPr lang="de-DE" dirty="0" err="1"/>
+              <a:t>volume</a:t>
+            </a:r>
+            <a:r>
+              <a:rPr lang="de-DE" dirty="0"/>
+              <a:t> 3, </a:t>
+            </a:r>
+            <a:r>
+              <a:rPr lang="de-DE" dirty="0" err="1"/>
+              <a:t>pages</a:t>
+            </a:r>
+            <a:r>
+              <a:rPr lang="de-DE" dirty="0"/>
+              <a:t> 616–623. Washington DC), 2003. </a:t>
+            </a:r>
+          </a:p>
+          <a:p>
+            <a:r>
+              <a:rPr lang="de-DE" dirty="0" smtClean="0"/>
+              <a:t>Theresa </a:t>
+            </a:r>
+            <a:r>
+              <a:rPr lang="de-DE" dirty="0"/>
+              <a:t>Wilson, </a:t>
+            </a:r>
+            <a:r>
+              <a:rPr lang="de-DE" dirty="0" err="1"/>
+              <a:t>Janyce</a:t>
+            </a:r>
+            <a:r>
+              <a:rPr lang="de-DE" dirty="0"/>
+              <a:t> Wiebe, </a:t>
+            </a:r>
+            <a:r>
+              <a:rPr lang="de-DE" dirty="0" err="1"/>
+              <a:t>and</a:t>
+            </a:r>
+            <a:r>
+              <a:rPr lang="de-DE" dirty="0"/>
+              <a:t> Paul Hoffmann. </a:t>
+            </a:r>
+            <a:r>
+              <a:rPr lang="de-DE" dirty="0" err="1"/>
+              <a:t>Recognizing</a:t>
+            </a:r>
+            <a:r>
+              <a:rPr lang="de-DE" dirty="0"/>
+              <a:t> </a:t>
+            </a:r>
+            <a:r>
+              <a:rPr lang="de-DE" dirty="0" err="1"/>
+              <a:t>con</a:t>
+            </a:r>
+            <a:r>
+              <a:rPr lang="de-DE" dirty="0"/>
+              <a:t>- </a:t>
+            </a:r>
+            <a:r>
+              <a:rPr lang="de-DE" dirty="0" err="1"/>
+              <a:t>textual</a:t>
+            </a:r>
+            <a:r>
+              <a:rPr lang="de-DE" dirty="0"/>
+              <a:t> </a:t>
+            </a:r>
+            <a:r>
+              <a:rPr lang="de-DE" dirty="0" err="1"/>
+              <a:t>polarity</a:t>
+            </a:r>
+            <a:r>
+              <a:rPr lang="de-DE" dirty="0"/>
+              <a:t> in </a:t>
+            </a:r>
+            <a:r>
+              <a:rPr lang="de-DE" dirty="0" err="1"/>
+              <a:t>phrase</a:t>
+            </a:r>
+            <a:r>
+              <a:rPr lang="de-DE" dirty="0"/>
+              <a:t>-level </a:t>
+            </a:r>
+            <a:r>
+              <a:rPr lang="de-DE" dirty="0" err="1"/>
+              <a:t>sentiment</a:t>
+            </a:r>
+            <a:r>
+              <a:rPr lang="de-DE" dirty="0"/>
+              <a:t> </a:t>
+            </a:r>
+            <a:r>
+              <a:rPr lang="de-DE" dirty="0" err="1"/>
+              <a:t>analysis</a:t>
+            </a:r>
+            <a:r>
+              <a:rPr lang="de-DE" dirty="0"/>
+              <a:t>. In </a:t>
+            </a:r>
+            <a:r>
+              <a:rPr lang="de-DE" dirty="0" err="1"/>
+              <a:t>Proceedings</a:t>
+            </a:r>
+            <a:r>
+              <a:rPr lang="de-DE" dirty="0"/>
+              <a:t> </a:t>
+            </a:r>
+            <a:r>
+              <a:rPr lang="de-DE" dirty="0" err="1"/>
+              <a:t>of</a:t>
+            </a:r>
+            <a:r>
+              <a:rPr lang="de-DE" dirty="0"/>
+              <a:t> </a:t>
+            </a:r>
+            <a:r>
+              <a:rPr lang="de-DE" dirty="0" err="1"/>
+              <a:t>the</a:t>
+            </a:r>
+            <a:r>
+              <a:rPr lang="de-DE" dirty="0"/>
+              <a:t> </a:t>
+            </a:r>
+            <a:r>
+              <a:rPr lang="de-DE" dirty="0" err="1"/>
+              <a:t>conference</a:t>
+            </a:r>
+            <a:r>
+              <a:rPr lang="de-DE" dirty="0"/>
+              <a:t> on human </a:t>
+            </a:r>
+            <a:r>
+              <a:rPr lang="de-DE" dirty="0" err="1"/>
+              <a:t>language</a:t>
+            </a:r>
+            <a:r>
+              <a:rPr lang="de-DE" dirty="0"/>
+              <a:t> </a:t>
+            </a:r>
+            <a:r>
+              <a:rPr lang="de-DE" dirty="0" err="1"/>
+              <a:t>technology</a:t>
+            </a:r>
+            <a:r>
+              <a:rPr lang="de-DE" dirty="0"/>
+              <a:t> </a:t>
+            </a:r>
+            <a:r>
+              <a:rPr lang="de-DE" dirty="0" err="1"/>
+              <a:t>and</a:t>
+            </a:r>
+            <a:r>
+              <a:rPr lang="de-DE" dirty="0"/>
+              <a:t> </a:t>
+            </a:r>
+            <a:r>
+              <a:rPr lang="de-DE" dirty="0" err="1"/>
+              <a:t>empirical</a:t>
+            </a:r>
+            <a:r>
+              <a:rPr lang="de-DE" dirty="0"/>
+              <a:t> </a:t>
+            </a:r>
+            <a:r>
+              <a:rPr lang="de-DE" dirty="0" err="1"/>
+              <a:t>methods</a:t>
+            </a:r>
+            <a:r>
+              <a:rPr lang="de-DE" dirty="0"/>
+              <a:t> in </a:t>
+            </a:r>
+            <a:r>
+              <a:rPr lang="de-DE" dirty="0" err="1"/>
+              <a:t>nat</a:t>
+            </a:r>
+            <a:r>
+              <a:rPr lang="de-DE" dirty="0"/>
+              <a:t>- </a:t>
+            </a:r>
+            <a:r>
+              <a:rPr lang="de-DE" dirty="0" err="1"/>
+              <a:t>ural</a:t>
+            </a:r>
+            <a:r>
+              <a:rPr lang="de-DE" dirty="0"/>
+              <a:t> </a:t>
+            </a:r>
+            <a:r>
+              <a:rPr lang="de-DE" dirty="0" err="1"/>
+              <a:t>language</a:t>
+            </a:r>
+            <a:r>
+              <a:rPr lang="de-DE" dirty="0"/>
+              <a:t> </a:t>
+            </a:r>
+            <a:r>
+              <a:rPr lang="de-DE" dirty="0" err="1"/>
+              <a:t>processing</a:t>
+            </a:r>
+            <a:r>
+              <a:rPr lang="de-DE" dirty="0"/>
+              <a:t>, </a:t>
+            </a:r>
+            <a:r>
+              <a:rPr lang="de-DE" dirty="0" err="1"/>
+              <a:t>pages</a:t>
+            </a:r>
+            <a:r>
+              <a:rPr lang="de-DE" dirty="0"/>
+              <a:t> 347–354. </a:t>
+            </a:r>
+            <a:r>
+              <a:rPr lang="de-DE" dirty="0" err="1"/>
+              <a:t>Association</a:t>
+            </a:r>
+            <a:r>
+              <a:rPr lang="de-DE" dirty="0"/>
+              <a:t> </a:t>
+            </a:r>
+            <a:r>
+              <a:rPr lang="de-DE" dirty="0" err="1"/>
+              <a:t>for</a:t>
+            </a:r>
+            <a:r>
+              <a:rPr lang="de-DE" dirty="0"/>
+              <a:t> </a:t>
+            </a:r>
+            <a:r>
+              <a:rPr lang="de-DE" dirty="0" err="1"/>
+              <a:t>Computational</a:t>
+            </a:r>
+            <a:r>
+              <a:rPr lang="de-DE" dirty="0"/>
+              <a:t> </a:t>
+            </a:r>
+            <a:r>
+              <a:rPr lang="de-DE" dirty="0" err="1"/>
+              <a:t>Linguistics</a:t>
+            </a:r>
+            <a:r>
+              <a:rPr lang="de-DE" dirty="0"/>
+              <a:t>, 2005. </a:t>
+            </a:r>
+          </a:p>
+          <a:p>
+            <a:r>
+              <a:rPr lang="de-DE" dirty="0" smtClean="0"/>
+              <a:t>Dan </a:t>
+            </a:r>
+            <a:r>
+              <a:rPr lang="de-DE" dirty="0"/>
+              <a:t>Yang </a:t>
+            </a:r>
+            <a:r>
+              <a:rPr lang="de-DE" dirty="0" err="1"/>
+              <a:t>and</a:t>
+            </a:r>
+            <a:r>
+              <a:rPr lang="de-DE" dirty="0"/>
+              <a:t> Won-</a:t>
+            </a:r>
+            <a:r>
+              <a:rPr lang="de-DE" dirty="0" err="1"/>
+              <a:t>Sook</a:t>
+            </a:r>
+            <a:r>
+              <a:rPr lang="de-DE" dirty="0"/>
+              <a:t> Lee. Music </a:t>
+            </a:r>
+            <a:r>
+              <a:rPr lang="de-DE" dirty="0" err="1"/>
+              <a:t>emotion</a:t>
+            </a:r>
+            <a:r>
+              <a:rPr lang="de-DE" dirty="0"/>
+              <a:t> </a:t>
+            </a:r>
+            <a:r>
+              <a:rPr lang="de-DE" dirty="0" err="1"/>
+              <a:t>identification</a:t>
+            </a:r>
+            <a:r>
+              <a:rPr lang="de-DE" dirty="0"/>
+              <a:t> </a:t>
+            </a:r>
+            <a:r>
+              <a:rPr lang="de-DE" dirty="0" err="1"/>
+              <a:t>from</a:t>
+            </a:r>
+            <a:r>
+              <a:rPr lang="de-DE" dirty="0"/>
+              <a:t> </a:t>
+            </a:r>
+            <a:r>
+              <a:rPr lang="de-DE" dirty="0" err="1"/>
+              <a:t>lyrics</a:t>
+            </a:r>
+            <a:r>
+              <a:rPr lang="de-DE" dirty="0"/>
+              <a:t>. In Multimedia, 2009. ISM’09. 11th IEEE International Symposium on, </a:t>
+            </a:r>
+            <a:r>
+              <a:rPr lang="de-DE" dirty="0" err="1"/>
+              <a:t>pages</a:t>
+            </a:r>
+            <a:r>
+              <a:rPr lang="de-DE" dirty="0"/>
+              <a:t> 624–629. IEEE, 2009. </a:t>
+            </a:r>
+          </a:p>
+          <a:p>
+            <a:r>
+              <a:rPr lang="de-DE" dirty="0" smtClean="0"/>
+              <a:t>Yi</a:t>
+            </a:r>
+            <a:r>
+              <a:rPr lang="de-DE" dirty="0"/>
+              <a:t>-</a:t>
+            </a:r>
+            <a:r>
+              <a:rPr lang="de-DE" dirty="0" err="1"/>
+              <a:t>Hsuan</a:t>
+            </a:r>
+            <a:r>
+              <a:rPr lang="de-DE" dirty="0"/>
+              <a:t> Yang, </a:t>
+            </a:r>
+            <a:r>
+              <a:rPr lang="de-DE" dirty="0" err="1"/>
+              <a:t>Yu-Ching</a:t>
+            </a:r>
+            <a:r>
+              <a:rPr lang="de-DE" dirty="0"/>
+              <a:t> Lin, </a:t>
+            </a:r>
+            <a:r>
+              <a:rPr lang="de-DE" dirty="0" err="1"/>
+              <a:t>Ya</a:t>
+            </a:r>
+            <a:r>
+              <a:rPr lang="de-DE" dirty="0"/>
+              <a:t>-Fan Su, </a:t>
+            </a:r>
+            <a:r>
+              <a:rPr lang="de-DE" dirty="0" err="1"/>
+              <a:t>and</a:t>
+            </a:r>
+            <a:r>
+              <a:rPr lang="de-DE" dirty="0"/>
+              <a:t> Homer H Chen. A </a:t>
+            </a:r>
+            <a:r>
+              <a:rPr lang="de-DE" dirty="0" err="1"/>
+              <a:t>regression</a:t>
+            </a:r>
+            <a:r>
+              <a:rPr lang="de-DE" dirty="0"/>
+              <a:t> </a:t>
+            </a:r>
+            <a:r>
+              <a:rPr lang="de-DE" dirty="0" err="1"/>
+              <a:t>approach</a:t>
+            </a:r>
+            <a:r>
+              <a:rPr lang="de-DE" dirty="0"/>
+              <a:t> </a:t>
+            </a:r>
+            <a:r>
+              <a:rPr lang="de-DE" dirty="0" err="1"/>
+              <a:t>to</a:t>
+            </a:r>
+            <a:r>
+              <a:rPr lang="de-DE" dirty="0"/>
+              <a:t> </a:t>
+            </a:r>
+            <a:r>
+              <a:rPr lang="de-DE" dirty="0" err="1"/>
+              <a:t>music</a:t>
+            </a:r>
+            <a:r>
+              <a:rPr lang="de-DE" dirty="0"/>
+              <a:t> </a:t>
+            </a:r>
+            <a:r>
+              <a:rPr lang="de-DE" dirty="0" err="1"/>
+              <a:t>emotion</a:t>
+            </a:r>
+            <a:r>
+              <a:rPr lang="de-DE" dirty="0"/>
+              <a:t> </a:t>
+            </a:r>
+            <a:r>
+              <a:rPr lang="de-DE" dirty="0" err="1"/>
+              <a:t>recognition</a:t>
+            </a:r>
+            <a:r>
+              <a:rPr lang="de-DE" dirty="0"/>
+              <a:t>. Audio, Speech, </a:t>
+            </a:r>
+            <a:r>
+              <a:rPr lang="de-DE" dirty="0" err="1"/>
+              <a:t>and</a:t>
+            </a:r>
+            <a:r>
+              <a:rPr lang="de-DE" dirty="0"/>
+              <a:t> Language Processing, IEEE Transactions on, 16(2):448–457, 2008. </a:t>
+            </a:r>
+          </a:p>
+          <a:p>
             <a:endParaRPr lang="de-DE" dirty="0"/>
           </a:p>
         </p:txBody>
@@ -10287,7 +9971,7 @@
           <a:bodyPr/>
           <a:lstStyle/>
           <a:p>
-            <a:fld id="{2D4733B8-70C3-6141-8B66-0EF5CA422C2F}" type="datetime5">
+            <a:fld id="{0176A06F-AB14-F94A-8BCE-1C0CB4911F8E}" type="datetime5">
               <a:rPr lang="de-DE" smtClean="0"/>
               <a:t>19-Okt-15</a:t>
             </a:fld>
@@ -10344,13 +10028,20 @@
     </p:spTree>
     <p:extLst>
       <p:ext uri="{BB962C8B-B14F-4D97-AF65-F5344CB8AC3E}">
-        <p14:creationId xmlns:p14="http://schemas.microsoft.com/office/powerpoint/2010/main" val="2193966775"/>
+        <p14:creationId xmlns:p14="http://schemas.microsoft.com/office/powerpoint/2010/main" val="1097196558"/>
       </p:ext>
     </p:extLst>
   </p:cSld>
   <p:clrMapOvr>
     <a:masterClrMapping/>
   </p:clrMapOvr>
+  <p:timing>
+    <p:tnLst>
+      <p:par>
+        <p:cTn xmlns:p14="http://schemas.microsoft.com/office/powerpoint/2010/main" id="1" dur="indefinite" restart="never" nodeType="tmRoot"/>
+      </p:par>
+    </p:tnLst>
+  </p:timing>
 </p:sld>
 </file>
 
@@ -10383,14 +10074,12 @@
         </p:nvSpPr>
         <p:spPr/>
         <p:txBody>
-          <a:bodyPr>
-            <a:normAutofit/>
-          </a:bodyPr>
+          <a:bodyPr/>
           <a:lstStyle/>
           <a:p>
             <a:r>
               <a:rPr lang="de-DE" dirty="0" smtClean="0"/>
-              <a:t>References</a:t>
+              <a:t>Resources</a:t>
             </a:r>
             <a:endParaRPr lang="de-DE" dirty="0"/>
           </a:p>
@@ -10408,852 +10097,82 @@
         </p:nvSpPr>
         <p:spPr/>
         <p:txBody>
-          <a:bodyPr>
-            <a:normAutofit fontScale="47500" lnSpcReduction="20000"/>
-          </a:bodyPr>
+          <a:bodyPr/>
           <a:lstStyle/>
           <a:p>
             <a:r>
               <a:rPr lang="de-DE" dirty="0"/>
-              <a:t>XHJS </a:t>
+              <a:t>[1] http://</a:t>
             </a:r>
             <a:r>
               <a:rPr lang="de-DE" dirty="0" err="1"/>
-              <a:t>Downie</a:t>
+              <a:t>respiratio-coaching.de</a:t>
             </a:r>
             <a:r>
               <a:rPr lang="de-DE" dirty="0"/>
-              <a:t>, Cyril Laurier, </a:t>
+              <a:t>/</a:t>
             </a:r>
             <a:r>
               <a:rPr lang="de-DE" dirty="0" err="1"/>
-              <a:t>and</a:t>
+              <a:t>wp</a:t>
             </a:r>
             <a:r>
               <a:rPr lang="de-DE" dirty="0"/>
-              <a:t> MBAF Ehmann. The 2007 </a:t>
+              <a:t>-content/</a:t>
             </a:r>
             <a:r>
               <a:rPr lang="de-DE" dirty="0" err="1"/>
-              <a:t>mirex</a:t>
+              <a:t>uploads</a:t>
             </a:r>
             <a:r>
               <a:rPr lang="de-DE" dirty="0"/>
-              <a:t> au- </a:t>
+              <a:t>/2013/08/</a:t>
             </a:r>
             <a:r>
               <a:rPr lang="de-DE" dirty="0" err="1"/>
-              <a:t>dio</a:t>
+              <a:t>therapie_small.png</a:t>
+            </a:r>
+            <a:endParaRPr lang="de-DE" dirty="0"/>
+          </a:p>
+          <a:p>
+            <a:r>
+              <a:rPr lang="de-DE" dirty="0" smtClean="0"/>
+              <a:t>[2</a:t>
             </a:r>
             <a:r>
               <a:rPr lang="de-DE" dirty="0"/>
-              <a:t> </a:t>
+              <a:t>] https://</a:t>
             </a:r>
             <a:r>
               <a:rPr lang="de-DE" dirty="0" err="1"/>
-              <a:t>mood</a:t>
+              <a:t>player.spotify.com</a:t>
             </a:r>
             <a:r>
               <a:rPr lang="de-DE" dirty="0"/>
-              <a:t> </a:t>
+              <a:t>/browse</a:t>
+            </a:r>
+          </a:p>
+          <a:p>
+            <a:r>
+              <a:rPr lang="de-DE" dirty="0" smtClean="0"/>
+              <a:t>[3] http</a:t>
+            </a:r>
+            <a:r>
+              <a:rPr lang="de-DE" dirty="0"/>
+              <a:t>://</a:t>
             </a:r>
             <a:r>
               <a:rPr lang="de-DE" dirty="0" err="1"/>
-              <a:t>classification</a:t>
+              <a:t>www.allmusic.com</a:t>
             </a:r>
             <a:r>
               <a:rPr lang="de-DE" dirty="0"/>
-              <a:t> </a:t>
+              <a:t>/</a:t>
             </a:r>
             <a:r>
               <a:rPr lang="de-DE" dirty="0" err="1"/>
-              <a:t>task</a:t>
-            </a:r>
-            <a:r>
-              <a:rPr lang="de-DE" dirty="0"/>
-              <a:t>: </a:t>
-            </a:r>
-            <a:r>
-              <a:rPr lang="de-DE" dirty="0" err="1"/>
-              <a:t>Lessons</a:t>
-            </a:r>
-            <a:r>
-              <a:rPr lang="de-DE" dirty="0"/>
-              <a:t> </a:t>
-            </a:r>
-            <a:r>
-              <a:rPr lang="de-DE" dirty="0" err="1"/>
-              <a:t>learned</a:t>
-            </a:r>
-            <a:r>
-              <a:rPr lang="de-DE" dirty="0"/>
-              <a:t>. In ISMIR 2008: </a:t>
-            </a:r>
-            <a:r>
-              <a:rPr lang="de-DE" dirty="0" err="1"/>
-              <a:t>Proceed</a:t>
-            </a:r>
-            <a:r>
-              <a:rPr lang="de-DE" dirty="0"/>
-              <a:t>- </a:t>
-            </a:r>
-            <a:r>
-              <a:rPr lang="de-DE" dirty="0" err="1"/>
-              <a:t>ings</a:t>
-            </a:r>
-            <a:r>
-              <a:rPr lang="de-DE" dirty="0"/>
-              <a:t> </a:t>
-            </a:r>
-            <a:r>
-              <a:rPr lang="de-DE" dirty="0" err="1"/>
-              <a:t>of</a:t>
-            </a:r>
-            <a:r>
-              <a:rPr lang="de-DE" dirty="0"/>
-              <a:t> </a:t>
-            </a:r>
-            <a:r>
-              <a:rPr lang="de-DE" dirty="0" err="1"/>
-              <a:t>the</a:t>
-            </a:r>
-            <a:r>
-              <a:rPr lang="de-DE" dirty="0"/>
-              <a:t> 9th International Conference </a:t>
-            </a:r>
-            <a:r>
-              <a:rPr lang="de-DE" dirty="0" err="1"/>
-              <a:t>of</a:t>
-            </a:r>
-            <a:r>
-              <a:rPr lang="de-DE" dirty="0"/>
-              <a:t> Music Information </a:t>
-            </a:r>
-            <a:r>
-              <a:rPr lang="de-DE" dirty="0" err="1"/>
-              <a:t>Retrieval</a:t>
-            </a:r>
-            <a:r>
-              <a:rPr lang="de-DE" dirty="0"/>
-              <a:t>, </a:t>
-            </a:r>
-            <a:r>
-              <a:rPr lang="de-DE" dirty="0" err="1"/>
-              <a:t>page</a:t>
-            </a:r>
-            <a:r>
-              <a:rPr lang="de-DE" dirty="0"/>
-              <a:t> 462. Lulu. </a:t>
-            </a:r>
-            <a:r>
-              <a:rPr lang="de-DE" dirty="0" err="1"/>
-              <a:t>com</a:t>
-            </a:r>
-            <a:r>
-              <a:rPr lang="de-DE" dirty="0"/>
-              <a:t>, 2008. </a:t>
-            </a:r>
-          </a:p>
-          <a:p>
-            <a:r>
-              <a:rPr lang="de-DE" dirty="0" err="1" smtClean="0"/>
-              <a:t>Youngmoo</a:t>
-            </a:r>
-            <a:r>
-              <a:rPr lang="de-DE" dirty="0" smtClean="0"/>
-              <a:t> </a:t>
-            </a:r>
-            <a:r>
-              <a:rPr lang="de-DE" dirty="0"/>
-              <a:t>E Kim, Erik M Schmidt, Raymond </a:t>
-            </a:r>
-            <a:r>
-              <a:rPr lang="de-DE" dirty="0" err="1"/>
-              <a:t>Migneco</a:t>
-            </a:r>
-            <a:r>
-              <a:rPr lang="de-DE" dirty="0"/>
-              <a:t>, Brandon G Morton, Patrick Richardson, Jeffrey Scott, </a:t>
-            </a:r>
-            <a:r>
-              <a:rPr lang="de-DE" dirty="0" err="1"/>
-              <a:t>Jacquelin</a:t>
-            </a:r>
-            <a:r>
-              <a:rPr lang="de-DE" dirty="0"/>
-              <a:t> A Speck, </a:t>
-            </a:r>
-            <a:r>
-              <a:rPr lang="de-DE" dirty="0" err="1"/>
-              <a:t>and</a:t>
-            </a:r>
-            <a:r>
-              <a:rPr lang="de-DE" dirty="0"/>
-              <a:t> Dou- glas </a:t>
-            </a:r>
-            <a:r>
-              <a:rPr lang="de-DE" dirty="0" err="1"/>
-              <a:t>Turnbull</a:t>
-            </a:r>
-            <a:r>
-              <a:rPr lang="de-DE" dirty="0"/>
-              <a:t>. Music </a:t>
-            </a:r>
-            <a:r>
-              <a:rPr lang="de-DE" dirty="0" err="1"/>
-              <a:t>emotion</a:t>
-            </a:r>
-            <a:r>
-              <a:rPr lang="de-DE" dirty="0"/>
-              <a:t> </a:t>
-            </a:r>
-            <a:r>
-              <a:rPr lang="de-DE" dirty="0" err="1"/>
-              <a:t>recognition</a:t>
-            </a:r>
-            <a:r>
-              <a:rPr lang="de-DE" dirty="0"/>
-              <a:t>: A </a:t>
-            </a:r>
-            <a:r>
-              <a:rPr lang="de-DE" dirty="0" err="1"/>
-              <a:t>state</a:t>
-            </a:r>
-            <a:r>
-              <a:rPr lang="de-DE" dirty="0"/>
-              <a:t> </a:t>
-            </a:r>
-            <a:r>
-              <a:rPr lang="de-DE" dirty="0" err="1"/>
-              <a:t>of</a:t>
-            </a:r>
-            <a:r>
-              <a:rPr lang="de-DE" dirty="0"/>
-              <a:t> </a:t>
-            </a:r>
-            <a:r>
-              <a:rPr lang="de-DE" dirty="0" err="1"/>
-              <a:t>the</a:t>
-            </a:r>
-            <a:r>
-              <a:rPr lang="de-DE" dirty="0"/>
-              <a:t> </a:t>
-            </a:r>
-            <a:r>
-              <a:rPr lang="de-DE" dirty="0" err="1"/>
-              <a:t>art</a:t>
-            </a:r>
-            <a:r>
-              <a:rPr lang="de-DE" dirty="0"/>
-              <a:t> </a:t>
-            </a:r>
-            <a:r>
-              <a:rPr lang="de-DE" dirty="0" err="1"/>
-              <a:t>review</a:t>
-            </a:r>
-            <a:r>
-              <a:rPr lang="de-DE" dirty="0"/>
-              <a:t>. In </a:t>
-            </a:r>
-            <a:r>
-              <a:rPr lang="de-DE" dirty="0" err="1"/>
-              <a:t>Proc</a:t>
-            </a:r>
-            <a:r>
-              <a:rPr lang="de-DE" dirty="0"/>
-              <a:t>. ISMIR, </a:t>
-            </a:r>
-            <a:r>
-              <a:rPr lang="de-DE" dirty="0" err="1"/>
-              <a:t>pages</a:t>
-            </a:r>
-            <a:r>
-              <a:rPr lang="de-DE" dirty="0"/>
-              <a:t> 255–266. </a:t>
-            </a:r>
-            <a:r>
-              <a:rPr lang="de-DE" dirty="0" err="1"/>
-              <a:t>Citeseer</a:t>
-            </a:r>
-            <a:r>
-              <a:rPr lang="de-DE" dirty="0"/>
-              <a:t>, 2010. </a:t>
-            </a:r>
-          </a:p>
-          <a:p>
-            <a:r>
-              <a:rPr lang="de-DE" dirty="0" smtClean="0"/>
-              <a:t>Yong </a:t>
-            </a:r>
-            <a:r>
-              <a:rPr lang="de-DE" dirty="0"/>
-              <a:t>H Li </a:t>
-            </a:r>
-            <a:r>
-              <a:rPr lang="de-DE" dirty="0" err="1"/>
-              <a:t>and</a:t>
-            </a:r>
-            <a:r>
-              <a:rPr lang="de-DE" dirty="0"/>
-              <a:t> Anil K. Jain. </a:t>
-            </a:r>
-            <a:r>
-              <a:rPr lang="de-DE" dirty="0" err="1"/>
-              <a:t>Classification</a:t>
-            </a:r>
-            <a:r>
-              <a:rPr lang="de-DE" dirty="0"/>
-              <a:t> </a:t>
-            </a:r>
-            <a:r>
-              <a:rPr lang="de-DE" dirty="0" err="1"/>
-              <a:t>of</a:t>
-            </a:r>
-            <a:r>
-              <a:rPr lang="de-DE" dirty="0"/>
-              <a:t> </a:t>
-            </a:r>
-            <a:r>
-              <a:rPr lang="de-DE" dirty="0" err="1"/>
-              <a:t>text</a:t>
-            </a:r>
-            <a:r>
-              <a:rPr lang="de-DE" dirty="0"/>
-              <a:t> </a:t>
-            </a:r>
-            <a:r>
-              <a:rPr lang="de-DE" dirty="0" err="1"/>
-              <a:t>documents</a:t>
-            </a:r>
-            <a:r>
-              <a:rPr lang="de-DE" dirty="0"/>
-              <a:t>. The Computer Journal, 41(8):537–546, 1998. </a:t>
-            </a:r>
-          </a:p>
-          <a:p>
-            <a:r>
-              <a:rPr lang="de-DE" dirty="0" smtClean="0"/>
-              <a:t>Thomas </a:t>
-            </a:r>
-            <a:r>
-              <a:rPr lang="de-DE" dirty="0"/>
-              <a:t>M. Mitchell. </a:t>
-            </a:r>
-            <a:r>
-              <a:rPr lang="de-DE" dirty="0" err="1"/>
-              <a:t>Machine</a:t>
-            </a:r>
-            <a:r>
-              <a:rPr lang="de-DE" dirty="0"/>
-              <a:t> Learning. McGraw-Hill, Inc., New York, NY, USA, 1 </a:t>
-            </a:r>
-            <a:r>
-              <a:rPr lang="de-DE" dirty="0" err="1"/>
-              <a:t>edition</a:t>
-            </a:r>
-            <a:r>
-              <a:rPr lang="de-DE" dirty="0"/>
-              <a:t>, 1997. </a:t>
-            </a:r>
-            <a:endParaRPr lang="de-DE" dirty="0" smtClean="0"/>
-          </a:p>
-          <a:p>
-            <a:r>
-              <a:rPr lang="de-DE" dirty="0" smtClean="0"/>
-              <a:t>Jason </a:t>
-            </a:r>
-            <a:r>
-              <a:rPr lang="de-DE" dirty="0"/>
-              <a:t>D </a:t>
-            </a:r>
-            <a:r>
-              <a:rPr lang="de-DE" dirty="0" err="1"/>
-              <a:t>Rennie</a:t>
-            </a:r>
-            <a:r>
-              <a:rPr lang="de-DE" dirty="0"/>
-              <a:t>, Lawrence </a:t>
-            </a:r>
-            <a:r>
-              <a:rPr lang="de-DE" dirty="0" err="1"/>
-              <a:t>Shih</a:t>
-            </a:r>
-            <a:r>
-              <a:rPr lang="de-DE" dirty="0"/>
-              <a:t>, Jaime </a:t>
-            </a:r>
-            <a:r>
-              <a:rPr lang="de-DE" dirty="0" err="1"/>
-              <a:t>Teevan</a:t>
-            </a:r>
-            <a:r>
-              <a:rPr lang="de-DE" dirty="0"/>
-              <a:t>, David R Karger, et al. Tackling </a:t>
-            </a:r>
-            <a:r>
-              <a:rPr lang="de-DE" dirty="0" err="1"/>
-              <a:t>the</a:t>
-            </a:r>
-            <a:r>
-              <a:rPr lang="de-DE" dirty="0"/>
-              <a:t> </a:t>
-            </a:r>
-            <a:r>
-              <a:rPr lang="de-DE" dirty="0" err="1"/>
-              <a:t>poor</a:t>
-            </a:r>
-            <a:r>
-              <a:rPr lang="de-DE" dirty="0"/>
-              <a:t> </a:t>
-            </a:r>
-            <a:r>
-              <a:rPr lang="de-DE" dirty="0" err="1"/>
-              <a:t>assumptions</a:t>
-            </a:r>
-            <a:r>
-              <a:rPr lang="de-DE" dirty="0"/>
-              <a:t> </a:t>
-            </a:r>
-            <a:r>
-              <a:rPr lang="de-DE" dirty="0" err="1"/>
-              <a:t>of</a:t>
-            </a:r>
-            <a:r>
-              <a:rPr lang="de-DE" dirty="0"/>
-              <a:t> naive </a:t>
-            </a:r>
-            <a:r>
-              <a:rPr lang="de-DE" dirty="0" err="1"/>
-              <a:t>bayes</a:t>
-            </a:r>
-            <a:r>
-              <a:rPr lang="de-DE" dirty="0"/>
-              <a:t> </a:t>
-            </a:r>
-            <a:r>
-              <a:rPr lang="de-DE" dirty="0" err="1"/>
-              <a:t>text</a:t>
-            </a:r>
-            <a:r>
-              <a:rPr lang="de-DE" dirty="0"/>
-              <a:t> </a:t>
-            </a:r>
-            <a:r>
-              <a:rPr lang="de-DE" dirty="0" err="1"/>
-              <a:t>classifiers</a:t>
-            </a:r>
-            <a:r>
-              <a:rPr lang="de-DE" dirty="0"/>
-              <a:t>. In ICML, </a:t>
-            </a:r>
-            <a:r>
-              <a:rPr lang="de-DE" dirty="0" err="1"/>
-              <a:t>volume</a:t>
-            </a:r>
-            <a:r>
-              <a:rPr lang="de-DE" dirty="0"/>
-              <a:t> 3, </a:t>
-            </a:r>
-            <a:r>
-              <a:rPr lang="de-DE" dirty="0" err="1"/>
-              <a:t>pages</a:t>
-            </a:r>
-            <a:r>
-              <a:rPr lang="de-DE" dirty="0"/>
-              <a:t> 616–623. Washington DC), 2003. </a:t>
-            </a:r>
-          </a:p>
-          <a:p>
-            <a:r>
-              <a:rPr lang="de-DE" dirty="0" smtClean="0"/>
-              <a:t>Theresa </a:t>
-            </a:r>
-            <a:r>
-              <a:rPr lang="de-DE" dirty="0"/>
-              <a:t>Wilson, </a:t>
-            </a:r>
-            <a:r>
-              <a:rPr lang="de-DE" dirty="0" err="1"/>
-              <a:t>Janyce</a:t>
-            </a:r>
-            <a:r>
-              <a:rPr lang="de-DE" dirty="0"/>
-              <a:t> Wiebe, </a:t>
-            </a:r>
-            <a:r>
-              <a:rPr lang="de-DE" dirty="0" err="1"/>
-              <a:t>and</a:t>
-            </a:r>
-            <a:r>
-              <a:rPr lang="de-DE" dirty="0"/>
-              <a:t> Paul Hoffmann. </a:t>
-            </a:r>
-            <a:r>
-              <a:rPr lang="de-DE" dirty="0" err="1"/>
-              <a:t>Recognizing</a:t>
-            </a:r>
-            <a:r>
-              <a:rPr lang="de-DE" dirty="0"/>
-              <a:t> </a:t>
-            </a:r>
-            <a:r>
-              <a:rPr lang="de-DE" dirty="0" err="1"/>
-              <a:t>con</a:t>
-            </a:r>
-            <a:r>
-              <a:rPr lang="de-DE" dirty="0"/>
-              <a:t>- </a:t>
-            </a:r>
-            <a:r>
-              <a:rPr lang="de-DE" dirty="0" err="1"/>
-              <a:t>textual</a:t>
-            </a:r>
-            <a:r>
-              <a:rPr lang="de-DE" dirty="0"/>
-              <a:t> </a:t>
-            </a:r>
-            <a:r>
-              <a:rPr lang="de-DE" dirty="0" err="1"/>
-              <a:t>polarity</a:t>
-            </a:r>
-            <a:r>
-              <a:rPr lang="de-DE" dirty="0"/>
-              <a:t> in </a:t>
-            </a:r>
-            <a:r>
-              <a:rPr lang="de-DE" dirty="0" err="1"/>
-              <a:t>phrase</a:t>
-            </a:r>
-            <a:r>
-              <a:rPr lang="de-DE" dirty="0"/>
-              <a:t>-level </a:t>
-            </a:r>
-            <a:r>
-              <a:rPr lang="de-DE" dirty="0" err="1"/>
-              <a:t>sentiment</a:t>
-            </a:r>
-            <a:r>
-              <a:rPr lang="de-DE" dirty="0"/>
-              <a:t> </a:t>
-            </a:r>
-            <a:r>
-              <a:rPr lang="de-DE" dirty="0" err="1"/>
-              <a:t>analysis</a:t>
-            </a:r>
-            <a:r>
-              <a:rPr lang="de-DE" dirty="0"/>
-              <a:t>. In </a:t>
-            </a:r>
-            <a:r>
-              <a:rPr lang="de-DE" dirty="0" err="1"/>
-              <a:t>Proceedings</a:t>
-            </a:r>
-            <a:r>
-              <a:rPr lang="de-DE" dirty="0"/>
-              <a:t> </a:t>
-            </a:r>
-            <a:r>
-              <a:rPr lang="de-DE" dirty="0" err="1"/>
-              <a:t>of</a:t>
-            </a:r>
-            <a:r>
-              <a:rPr lang="de-DE" dirty="0"/>
-              <a:t> </a:t>
-            </a:r>
-            <a:r>
-              <a:rPr lang="de-DE" dirty="0" err="1"/>
-              <a:t>the</a:t>
-            </a:r>
-            <a:r>
-              <a:rPr lang="de-DE" dirty="0"/>
-              <a:t> </a:t>
-            </a:r>
-            <a:r>
-              <a:rPr lang="de-DE" dirty="0" err="1"/>
-              <a:t>conference</a:t>
-            </a:r>
-            <a:r>
-              <a:rPr lang="de-DE" dirty="0"/>
-              <a:t> on human </a:t>
-            </a:r>
-            <a:r>
-              <a:rPr lang="de-DE" dirty="0" err="1"/>
-              <a:t>language</a:t>
-            </a:r>
-            <a:r>
-              <a:rPr lang="de-DE" dirty="0"/>
-              <a:t> </a:t>
-            </a:r>
-            <a:r>
-              <a:rPr lang="de-DE" dirty="0" err="1"/>
-              <a:t>technology</a:t>
-            </a:r>
-            <a:r>
-              <a:rPr lang="de-DE" dirty="0"/>
-              <a:t> </a:t>
-            </a:r>
-            <a:r>
-              <a:rPr lang="de-DE" dirty="0" err="1"/>
-              <a:t>and</a:t>
-            </a:r>
-            <a:r>
-              <a:rPr lang="de-DE" dirty="0"/>
-              <a:t> </a:t>
-            </a:r>
-            <a:r>
-              <a:rPr lang="de-DE" dirty="0" err="1"/>
-              <a:t>empirical</a:t>
-            </a:r>
-            <a:r>
-              <a:rPr lang="de-DE" dirty="0"/>
-              <a:t> </a:t>
-            </a:r>
-            <a:r>
-              <a:rPr lang="de-DE" dirty="0" err="1"/>
-              <a:t>methods</a:t>
-            </a:r>
-            <a:r>
-              <a:rPr lang="de-DE" dirty="0"/>
-              <a:t> in </a:t>
-            </a:r>
-            <a:r>
-              <a:rPr lang="de-DE" dirty="0" err="1"/>
-              <a:t>nat</a:t>
-            </a:r>
-            <a:r>
-              <a:rPr lang="de-DE" dirty="0"/>
-              <a:t>- </a:t>
-            </a:r>
-            <a:r>
-              <a:rPr lang="de-DE" dirty="0" err="1"/>
-              <a:t>ural</a:t>
-            </a:r>
-            <a:r>
-              <a:rPr lang="de-DE" dirty="0"/>
-              <a:t> </a:t>
-            </a:r>
-            <a:r>
-              <a:rPr lang="de-DE" dirty="0" err="1"/>
-              <a:t>language</a:t>
-            </a:r>
-            <a:r>
-              <a:rPr lang="de-DE" dirty="0"/>
-              <a:t> </a:t>
-            </a:r>
-            <a:r>
-              <a:rPr lang="de-DE" dirty="0" err="1"/>
-              <a:t>processing</a:t>
-            </a:r>
-            <a:r>
-              <a:rPr lang="de-DE" dirty="0"/>
-              <a:t>, </a:t>
-            </a:r>
-            <a:r>
-              <a:rPr lang="de-DE" dirty="0" err="1"/>
-              <a:t>pages</a:t>
-            </a:r>
-            <a:r>
-              <a:rPr lang="de-DE" dirty="0"/>
-              <a:t> 347–354. </a:t>
-            </a:r>
-            <a:r>
-              <a:rPr lang="de-DE" dirty="0" err="1"/>
-              <a:t>Association</a:t>
-            </a:r>
-            <a:r>
-              <a:rPr lang="de-DE" dirty="0"/>
-              <a:t> </a:t>
-            </a:r>
-            <a:r>
-              <a:rPr lang="de-DE" dirty="0" err="1"/>
-              <a:t>for</a:t>
-            </a:r>
-            <a:r>
-              <a:rPr lang="de-DE" dirty="0"/>
-              <a:t> </a:t>
-            </a:r>
-            <a:r>
-              <a:rPr lang="de-DE" dirty="0" err="1"/>
-              <a:t>Computational</a:t>
-            </a:r>
-            <a:r>
-              <a:rPr lang="de-DE" dirty="0"/>
-              <a:t> </a:t>
-            </a:r>
-            <a:r>
-              <a:rPr lang="de-DE" dirty="0" err="1"/>
-              <a:t>Linguistics</a:t>
-            </a:r>
-            <a:r>
-              <a:rPr lang="de-DE" dirty="0"/>
-              <a:t>, 2005. </a:t>
-            </a:r>
-          </a:p>
-          <a:p>
-            <a:r>
-              <a:rPr lang="de-DE" dirty="0" smtClean="0"/>
-              <a:t>Dan </a:t>
-            </a:r>
-            <a:r>
-              <a:rPr lang="de-DE" dirty="0"/>
-              <a:t>Yang </a:t>
-            </a:r>
-            <a:r>
-              <a:rPr lang="de-DE" dirty="0" err="1"/>
-              <a:t>and</a:t>
-            </a:r>
-            <a:r>
-              <a:rPr lang="de-DE" dirty="0"/>
-              <a:t> Won-</a:t>
-            </a:r>
-            <a:r>
-              <a:rPr lang="de-DE" dirty="0" err="1"/>
-              <a:t>Sook</a:t>
-            </a:r>
-            <a:r>
-              <a:rPr lang="de-DE" dirty="0"/>
-              <a:t> Lee. Music </a:t>
-            </a:r>
-            <a:r>
-              <a:rPr lang="de-DE" dirty="0" err="1"/>
-              <a:t>emotion</a:t>
-            </a:r>
-            <a:r>
-              <a:rPr lang="de-DE" dirty="0"/>
-              <a:t> </a:t>
-            </a:r>
-            <a:r>
-              <a:rPr lang="de-DE" dirty="0" err="1"/>
-              <a:t>identification</a:t>
-            </a:r>
-            <a:r>
-              <a:rPr lang="de-DE" dirty="0"/>
-              <a:t> </a:t>
-            </a:r>
-            <a:r>
-              <a:rPr lang="de-DE" dirty="0" err="1"/>
-              <a:t>from</a:t>
-            </a:r>
-            <a:r>
-              <a:rPr lang="de-DE" dirty="0"/>
-              <a:t> </a:t>
-            </a:r>
-            <a:r>
-              <a:rPr lang="de-DE" dirty="0" err="1"/>
-              <a:t>lyrics</a:t>
-            </a:r>
-            <a:r>
-              <a:rPr lang="de-DE" dirty="0"/>
-              <a:t>. In Multimedia, 2009. ISM’09. 11th IEEE International Symposium on, </a:t>
-            </a:r>
-            <a:r>
-              <a:rPr lang="de-DE" dirty="0" err="1"/>
-              <a:t>pages</a:t>
-            </a:r>
-            <a:r>
-              <a:rPr lang="de-DE" dirty="0"/>
-              <a:t> 624–629. IEEE, 2009. </a:t>
-            </a:r>
-          </a:p>
-          <a:p>
-            <a:r>
-              <a:rPr lang="de-DE" dirty="0" smtClean="0"/>
-              <a:t>Yi</a:t>
-            </a:r>
-            <a:r>
-              <a:rPr lang="de-DE" dirty="0"/>
-              <a:t>-</a:t>
-            </a:r>
-            <a:r>
-              <a:rPr lang="de-DE" dirty="0" err="1"/>
-              <a:t>Hsuan</a:t>
-            </a:r>
-            <a:r>
-              <a:rPr lang="de-DE" dirty="0"/>
-              <a:t> Yang, </a:t>
-            </a:r>
-            <a:r>
-              <a:rPr lang="de-DE" dirty="0" err="1"/>
-              <a:t>Yu-Ching</a:t>
-            </a:r>
-            <a:r>
-              <a:rPr lang="de-DE" dirty="0"/>
-              <a:t> Lin, </a:t>
-            </a:r>
-            <a:r>
-              <a:rPr lang="de-DE" dirty="0" err="1"/>
-              <a:t>Ya</a:t>
-            </a:r>
-            <a:r>
-              <a:rPr lang="de-DE" dirty="0"/>
-              <a:t>-Fan Su, </a:t>
-            </a:r>
-            <a:r>
-              <a:rPr lang="de-DE" dirty="0" err="1"/>
-              <a:t>and</a:t>
-            </a:r>
-            <a:r>
-              <a:rPr lang="de-DE" dirty="0"/>
-              <a:t> Homer H Chen. A </a:t>
-            </a:r>
-            <a:r>
-              <a:rPr lang="de-DE" dirty="0" err="1"/>
-              <a:t>regression</a:t>
-            </a:r>
-            <a:r>
-              <a:rPr lang="de-DE" dirty="0"/>
-              <a:t> </a:t>
-            </a:r>
-            <a:r>
-              <a:rPr lang="de-DE" dirty="0" err="1"/>
-              <a:t>approach</a:t>
-            </a:r>
-            <a:r>
-              <a:rPr lang="de-DE" dirty="0"/>
-              <a:t> </a:t>
-            </a:r>
-            <a:r>
-              <a:rPr lang="de-DE" dirty="0" err="1"/>
-              <a:t>to</a:t>
-            </a:r>
-            <a:r>
-              <a:rPr lang="de-DE" dirty="0"/>
-              <a:t> </a:t>
-            </a:r>
-            <a:r>
-              <a:rPr lang="de-DE" dirty="0" err="1"/>
-              <a:t>music</a:t>
-            </a:r>
-            <a:r>
-              <a:rPr lang="de-DE" dirty="0"/>
-              <a:t> </a:t>
-            </a:r>
-            <a:r>
-              <a:rPr lang="de-DE" dirty="0" err="1"/>
-              <a:t>emotion</a:t>
-            </a:r>
-            <a:r>
-              <a:rPr lang="de-DE" dirty="0"/>
-              <a:t> </a:t>
-            </a:r>
-            <a:r>
-              <a:rPr lang="de-DE" dirty="0" err="1"/>
-              <a:t>recognition</a:t>
-            </a:r>
-            <a:r>
-              <a:rPr lang="de-DE" dirty="0"/>
-              <a:t>. Audio, Speech, </a:t>
-            </a:r>
-            <a:r>
-              <a:rPr lang="de-DE" dirty="0" err="1"/>
-              <a:t>and</a:t>
-            </a:r>
-            <a:r>
-              <a:rPr lang="de-DE" dirty="0"/>
-              <a:t> Language Processing, IEEE Transactions on, 16(2):448–457, 2008. </a:t>
-            </a:r>
-          </a:p>
-          <a:p>
+              <a:t>moods</a:t>
+            </a:r>
             <a:endParaRPr lang="de-DE" dirty="0"/>
           </a:p>
         </p:txBody>
@@ -11322,227 +10241,6 @@
             <a:fld id="{C01938AF-F9EA-434A-A4EB-30D6D6E13CD1}" type="slidenum">
               <a:rPr lang="de-DE" smtClean="0"/>
               <a:t>17</a:t>
-            </a:fld>
-            <a:endParaRPr lang="de-DE"/>
-          </a:p>
-        </p:txBody>
-      </p:sp>
-    </p:spTree>
-    <p:extLst>
-      <p:ext uri="{BB962C8B-B14F-4D97-AF65-F5344CB8AC3E}">
-        <p14:creationId xmlns:p14="http://schemas.microsoft.com/office/powerpoint/2010/main" val="1097196558"/>
-      </p:ext>
-    </p:extLst>
-  </p:cSld>
-  <p:clrMapOvr>
-    <a:masterClrMapping/>
-  </p:clrMapOvr>
-  <p:timing>
-    <p:tnLst>
-      <p:par>
-        <p:cTn xmlns:p14="http://schemas.microsoft.com/office/powerpoint/2010/main" id="1" dur="indefinite" restart="never" nodeType="tmRoot"/>
-      </p:par>
-    </p:tnLst>
-  </p:timing>
-</p:sld>
-</file>
-
-<file path=ppt/slides/slide18.xml><?xml version="1.0" encoding="utf-8"?>
-<p:sld xmlns:a="http://schemas.openxmlformats.org/drawingml/2006/main" xmlns:r="http://schemas.openxmlformats.org/officeDocument/2006/relationships" xmlns:p="http://schemas.openxmlformats.org/presentationml/2006/main">
-  <p:cSld>
-    <p:spTree>
-      <p:nvGrpSpPr>
-        <p:cNvPr id="1" name=""/>
-        <p:cNvGrpSpPr/>
-        <p:nvPr/>
-      </p:nvGrpSpPr>
-      <p:grpSpPr>
-        <a:xfrm>
-          <a:off x="0" y="0"/>
-          <a:ext cx="0" cy="0"/>
-          <a:chOff x="0" y="0"/>
-          <a:chExt cx="0" cy="0"/>
-        </a:xfrm>
-      </p:grpSpPr>
-      <p:sp>
-        <p:nvSpPr>
-          <p:cNvPr id="2" name="Titel 1"/>
-          <p:cNvSpPr>
-            <a:spLocks noGrp="1"/>
-          </p:cNvSpPr>
-          <p:nvPr>
-            <p:ph type="title"/>
-          </p:nvPr>
-        </p:nvSpPr>
-        <p:spPr/>
-        <p:txBody>
-          <a:bodyPr/>
-          <a:lstStyle/>
-          <a:p>
-            <a:r>
-              <a:rPr lang="de-DE" dirty="0" smtClean="0"/>
-              <a:t>Resources</a:t>
-            </a:r>
-            <a:endParaRPr lang="de-DE" dirty="0"/>
-          </a:p>
-        </p:txBody>
-      </p:sp>
-      <p:sp>
-        <p:nvSpPr>
-          <p:cNvPr id="3" name="Inhaltsplatzhalter 2"/>
-          <p:cNvSpPr>
-            <a:spLocks noGrp="1"/>
-          </p:cNvSpPr>
-          <p:nvPr>
-            <p:ph idx="1"/>
-          </p:nvPr>
-        </p:nvSpPr>
-        <p:spPr/>
-        <p:txBody>
-          <a:bodyPr/>
-          <a:lstStyle/>
-          <a:p>
-            <a:r>
-              <a:rPr lang="de-DE" dirty="0"/>
-              <a:t>[1] http://</a:t>
-            </a:r>
-            <a:r>
-              <a:rPr lang="de-DE" dirty="0" err="1"/>
-              <a:t>respiratio-coaching.de</a:t>
-            </a:r>
-            <a:r>
-              <a:rPr lang="de-DE" dirty="0"/>
-              <a:t>/</a:t>
-            </a:r>
-            <a:r>
-              <a:rPr lang="de-DE" dirty="0" err="1"/>
-              <a:t>wp</a:t>
-            </a:r>
-            <a:r>
-              <a:rPr lang="de-DE" dirty="0"/>
-              <a:t>-content/</a:t>
-            </a:r>
-            <a:r>
-              <a:rPr lang="de-DE" dirty="0" err="1"/>
-              <a:t>uploads</a:t>
-            </a:r>
-            <a:r>
-              <a:rPr lang="de-DE" dirty="0"/>
-              <a:t>/2013/08/</a:t>
-            </a:r>
-            <a:r>
-              <a:rPr lang="de-DE" dirty="0" err="1"/>
-              <a:t>therapie_small.png</a:t>
-            </a:r>
-            <a:endParaRPr lang="de-DE" dirty="0"/>
-          </a:p>
-          <a:p>
-            <a:r>
-              <a:rPr lang="de-DE" dirty="0" smtClean="0"/>
-              <a:t>[2</a:t>
-            </a:r>
-            <a:r>
-              <a:rPr lang="de-DE" dirty="0"/>
-              <a:t>] https://</a:t>
-            </a:r>
-            <a:r>
-              <a:rPr lang="de-DE" dirty="0" err="1"/>
-              <a:t>player.spotify.com</a:t>
-            </a:r>
-            <a:r>
-              <a:rPr lang="de-DE" dirty="0"/>
-              <a:t>/browse</a:t>
-            </a:r>
-          </a:p>
-          <a:p>
-            <a:r>
-              <a:rPr lang="de-DE" dirty="0" smtClean="0"/>
-              <a:t>[3] http</a:t>
-            </a:r>
-            <a:r>
-              <a:rPr lang="de-DE" dirty="0"/>
-              <a:t>://</a:t>
-            </a:r>
-            <a:r>
-              <a:rPr lang="de-DE" dirty="0" err="1"/>
-              <a:t>www.allmusic.com</a:t>
-            </a:r>
-            <a:r>
-              <a:rPr lang="de-DE" dirty="0"/>
-              <a:t>/</a:t>
-            </a:r>
-            <a:r>
-              <a:rPr lang="de-DE" dirty="0" err="1"/>
-              <a:t>moods</a:t>
-            </a:r>
-            <a:endParaRPr lang="de-DE" dirty="0"/>
-          </a:p>
-        </p:txBody>
-      </p:sp>
-      <p:sp>
-        <p:nvSpPr>
-          <p:cNvPr id="4" name="Datumsplatzhalter 3"/>
-          <p:cNvSpPr>
-            <a:spLocks noGrp="1"/>
-          </p:cNvSpPr>
-          <p:nvPr>
-            <p:ph type="dt" sz="half" idx="10"/>
-          </p:nvPr>
-        </p:nvSpPr>
-        <p:spPr/>
-        <p:txBody>
-          <a:bodyPr/>
-          <a:lstStyle/>
-          <a:p>
-            <a:fld id="{0176A06F-AB14-F94A-8BCE-1C0CB4911F8E}" type="datetime5">
-              <a:rPr lang="de-DE" smtClean="0"/>
-              <a:t>19-Okt-15</a:t>
-            </a:fld>
-            <a:endParaRPr lang="de-DE"/>
-          </a:p>
-        </p:txBody>
-      </p:sp>
-      <p:sp>
-        <p:nvSpPr>
-          <p:cNvPr id="5" name="Fußzeilenplatzhalter 4"/>
-          <p:cNvSpPr>
-            <a:spLocks noGrp="1"/>
-          </p:cNvSpPr>
-          <p:nvPr>
-            <p:ph type="ftr" sz="quarter" idx="11"/>
-          </p:nvPr>
-        </p:nvSpPr>
-        <p:spPr/>
-        <p:txBody>
-          <a:bodyPr/>
-          <a:lstStyle/>
-          <a:p>
-            <a:r>
-              <a:rPr lang="de-DE" smtClean="0"/>
-              <a:t>A. Patel, C. Kaiser, L. Schmitz, N. Tatarakis </a:t>
-            </a:r>
-            <a:endParaRPr lang="de-DE"/>
-          </a:p>
-        </p:txBody>
-      </p:sp>
-      <p:sp>
-        <p:nvSpPr>
-          <p:cNvPr id="6" name="Foliennummernplatzhalter 5"/>
-          <p:cNvSpPr>
-            <a:spLocks noGrp="1"/>
-          </p:cNvSpPr>
-          <p:nvPr>
-            <p:ph type="sldNum" sz="quarter" idx="12"/>
-          </p:nvPr>
-        </p:nvSpPr>
-        <p:spPr/>
-        <p:txBody>
-          <a:bodyPr/>
-          <a:lstStyle/>
-          <a:p>
-            <a:fld id="{C01938AF-F9EA-434A-A4EB-30D6D6E13CD1}" type="slidenum">
-              <a:rPr lang="de-DE" smtClean="0"/>
-              <a:t>18</a:t>
             </a:fld>
             <a:endParaRPr lang="de-DE"/>
           </a:p>
@@ -11568,7 +10266,7 @@
 </p:sld>
 </file>
 
-<file path=ppt/slides/slide19.xml><?xml version="1.0" encoding="utf-8"?>
+<file path=ppt/slides/slide18.xml><?xml version="1.0" encoding="utf-8"?>
 <p:sld xmlns:a="http://schemas.openxmlformats.org/drawingml/2006/main" xmlns:r="http://schemas.openxmlformats.org/officeDocument/2006/relationships" xmlns:p="http://schemas.openxmlformats.org/presentationml/2006/main" show="0">
   <p:cSld>
     <p:spTree>
@@ -11691,7 +10389,7 @@
           <a:p>
             <a:fld id="{C01938AF-F9EA-434A-A4EB-30D6D6E13CD1}" type="slidenum">
               <a:rPr lang="de-DE" smtClean="0"/>
-              <a:t>19</a:t>
+              <a:t>18</a:t>
             </a:fld>
             <a:endParaRPr lang="de-DE"/>
           </a:p>
@@ -14248,6 +12946,13 @@
   <p:clrMapOvr>
     <a:masterClrMapping/>
   </p:clrMapOvr>
+  <p:timing>
+    <p:tnLst>
+      <p:par>
+        <p:cTn xmlns:p14="http://schemas.microsoft.com/office/powerpoint/2010/main" id="1" dur="indefinite" restart="never" nodeType="tmRoot"/>
+      </p:par>
+    </p:tnLst>
+  </p:timing>
 </p:sld>
 </file>
 

</xml_diff>